<commit_message>
edit Array color Array 1/ array 2 layout
</commit_message>
<xml_diff>
--- a/4. Report/W7_Improve_Report_Technical Team.pptx
+++ b/4. Report/W7_Improve_Report_Technical Team.pptx
@@ -5,19 +5,23 @@
     <p:sldMasterId id="2147483648" r:id="rId1"/>
   </p:sldMasterIdLst>
   <p:notesMasterIdLst>
-    <p:notesMasterId r:id="rId9"/>
+    <p:notesMasterId r:id="rId13"/>
   </p:notesMasterIdLst>
   <p:handoutMasterIdLst>
-    <p:handoutMasterId r:id="rId10"/>
+    <p:handoutMasterId r:id="rId14"/>
   </p:handoutMasterIdLst>
   <p:sldIdLst>
     <p:sldId id="256" r:id="rId2"/>
     <p:sldId id="262" r:id="rId3"/>
     <p:sldId id="263" r:id="rId4"/>
     <p:sldId id="264" r:id="rId5"/>
-    <p:sldId id="272" r:id="rId6"/>
-    <p:sldId id="273" r:id="rId7"/>
-    <p:sldId id="274" r:id="rId8"/>
+    <p:sldId id="273" r:id="rId6"/>
+    <p:sldId id="274" r:id="rId7"/>
+    <p:sldId id="275" r:id="rId8"/>
+    <p:sldId id="276" r:id="rId9"/>
+    <p:sldId id="277" r:id="rId10"/>
+    <p:sldId id="278" r:id="rId11"/>
+    <p:sldId id="280" r:id="rId12"/>
   </p:sldIdLst>
   <p:sldSz cx="9906000" cy="6858000" type="A4"/>
   <p:notesSz cx="9939338" cy="6807200"/>
@@ -152,6 +156,18 @@
     </p:ext>
   </p:extLst>
 </p:presentation>
+</file>
+
+<file path=ppt/commentAuthors.xml><?xml version="1.0" encoding="utf-8"?>
+<p:cmAuthorLst xmlns:a="http://schemas.openxmlformats.org/drawingml/2006/main" xmlns:r="http://schemas.openxmlformats.org/officeDocument/2006/relationships" xmlns:p="http://schemas.openxmlformats.org/presentationml/2006/main">
+  <p:cmAuthor id="1" name="HO VAN TAN" initials="HVT" lastIdx="1" clrIdx="0">
+    <p:extLst>
+      <p:ext uri="{19B8F6BF-5375-455C-9EA6-DF929625EA0E}">
+        <p15:presenceInfo xmlns:p15="http://schemas.microsoft.com/office/powerpoint/2012/main" userId="S-1-5-21-2748295605-66269954-873939976-3151" providerId="AD"/>
+      </p:ext>
+    </p:extLst>
+  </p:cmAuthor>
+</p:cmAuthorLst>
 </file>
 
 <file path=ppt/handoutMasters/handoutMaster1.xml><?xml version="1.0" encoding="utf-8"?>
@@ -1553,7 +1569,7 @@
                 <a:latin typeface="맑은 고딕" pitchFamily="50" charset="-127"/>
                 <a:ea typeface="맑은 고딕" pitchFamily="50" charset="-127"/>
               </a:rPr>
-              <a:t>2020. 02. 15</a:t>
+              <a:t>2020. 10. 28</a:t>
             </a:r>
           </a:p>
         </p:txBody>
@@ -1684,6 +1700,552 @@
     <p:extLst>
       <p:ext uri="{BB962C8B-B14F-4D97-AF65-F5344CB8AC3E}">
         <p14:creationId xmlns:p14="http://schemas.microsoft.com/office/powerpoint/2010/main" val="4004925809"/>
+      </p:ext>
+    </p:extLst>
+  </p:cSld>
+  <p:clrMapOvr>
+    <a:masterClrMapping/>
+  </p:clrMapOvr>
+</p:sld>
+</file>
+
+<file path=ppt/slides/slide10.xml><?xml version="1.0" encoding="utf-8"?>
+<p:sld xmlns:a="http://schemas.openxmlformats.org/drawingml/2006/main" xmlns:r="http://schemas.openxmlformats.org/officeDocument/2006/relationships" xmlns:p="http://schemas.openxmlformats.org/presentationml/2006/main">
+  <p:cSld>
+    <p:spTree>
+      <p:nvGrpSpPr>
+        <p:cNvPr id="1" name=""/>
+        <p:cNvGrpSpPr/>
+        <p:nvPr/>
+      </p:nvGrpSpPr>
+      <p:grpSpPr>
+        <a:xfrm>
+          <a:off x="0" y="0"/>
+          <a:ext cx="0" cy="0"/>
+          <a:chOff x="0" y="0"/>
+          <a:chExt cx="0" cy="0"/>
+        </a:xfrm>
+      </p:grpSpPr>
+      <p:sp>
+        <p:nvSpPr>
+          <p:cNvPr id="2" name="Slide Number Placeholder 1"/>
+          <p:cNvSpPr>
+            <a:spLocks noGrp="1"/>
+          </p:cNvSpPr>
+          <p:nvPr>
+            <p:ph type="sldNum" sz="quarter" idx="4"/>
+          </p:nvPr>
+        </p:nvSpPr>
+        <p:spPr/>
+        <p:txBody>
+          <a:bodyPr/>
+          <a:lstStyle/>
+          <a:p>
+            <a:r>
+              <a:rPr lang="en-US" altLang="ko-KR"/>
+              <a:t>- </a:t>
+            </a:r>
+            <a:fld id="{7E2C4B30-5DF7-4A82-974D-B66255C87543}" type="slidenum">
+              <a:rPr lang="ko-KR" altLang="en-US" smtClean="0"/>
+              <a:pPr/>
+              <a:t>9</a:t>
+            </a:fld>
+            <a:r>
+              <a:rPr lang="ko-KR" altLang="en-US"/>
+              <a:t> </a:t>
+            </a:r>
+            <a:r>
+              <a:rPr lang="en-US" altLang="ko-KR"/>
+              <a:t>-</a:t>
+            </a:r>
+            <a:endParaRPr lang="ko-KR" altLang="en-US"/>
+          </a:p>
+        </p:txBody>
+      </p:sp>
+      <p:sp>
+        <p:nvSpPr>
+          <p:cNvPr id="4" name="TextBox 3"/>
+          <p:cNvSpPr txBox="1"/>
+          <p:nvPr/>
+        </p:nvSpPr>
+        <p:spPr>
+          <a:xfrm>
+            <a:off x="288634" y="164068"/>
+            <a:ext cx="1510350" cy="400110"/>
+          </a:xfrm>
+          <a:prstGeom prst="rect">
+            <a:avLst/>
+          </a:prstGeom>
+          <a:noFill/>
+        </p:spPr>
+        <p:txBody>
+          <a:bodyPr wrap="none" rtlCol="0">
+            <a:spAutoFit/>
+          </a:bodyPr>
+          <a:lstStyle/>
+          <a:p>
+            <a:r>
+              <a:rPr lang="vi-VN" sz="2000" b="1" dirty="0">
+                <a:latin typeface="+mj-lt"/>
+              </a:rPr>
+              <a:t>4. Conveyor</a:t>
+            </a:r>
+            <a:endParaRPr lang="en-US" sz="2000" b="1" dirty="0">
+              <a:latin typeface="+mj-lt"/>
+            </a:endParaRPr>
+          </a:p>
+        </p:txBody>
+      </p:sp>
+      <p:pic>
+        <p:nvPicPr>
+          <p:cNvPr id="20" name="Picture 19">
+            <a:extLst>
+              <a:ext uri="{FF2B5EF4-FFF2-40B4-BE49-F238E27FC236}">
+                <a16:creationId xmlns:a16="http://schemas.microsoft.com/office/drawing/2014/main" id="{944EC06B-1924-4C41-B3AC-920DF8CD6893}"/>
+              </a:ext>
+            </a:extLst>
+          </p:cNvPr>
+          <p:cNvPicPr>
+            <a:picLocks noChangeAspect="1"/>
+          </p:cNvPicPr>
+          <p:nvPr/>
+        </p:nvPicPr>
+        <p:blipFill>
+          <a:blip r:embed="rId2"/>
+          <a:stretch>
+            <a:fillRect/>
+          </a:stretch>
+        </p:blipFill>
+        <p:spPr>
+          <a:xfrm>
+            <a:off x="437233" y="3487113"/>
+            <a:ext cx="3070898" cy="2456718"/>
+          </a:xfrm>
+          <a:prstGeom prst="rect">
+            <a:avLst/>
+          </a:prstGeom>
+        </p:spPr>
+      </p:pic>
+      <p:pic>
+        <p:nvPicPr>
+          <p:cNvPr id="22" name="Picture 21">
+            <a:extLst>
+              <a:ext uri="{FF2B5EF4-FFF2-40B4-BE49-F238E27FC236}">
+                <a16:creationId xmlns:a16="http://schemas.microsoft.com/office/drawing/2014/main" id="{53DE773C-05EF-48EA-B75E-F840C3997F14}"/>
+              </a:ext>
+            </a:extLst>
+          </p:cNvPr>
+          <p:cNvPicPr>
+            <a:picLocks noChangeAspect="1"/>
+          </p:cNvPicPr>
+          <p:nvPr/>
+        </p:nvPicPr>
+        <p:blipFill>
+          <a:blip r:embed="rId3"/>
+          <a:stretch>
+            <a:fillRect/>
+          </a:stretch>
+        </p:blipFill>
+        <p:spPr>
+          <a:xfrm>
+            <a:off x="3503369" y="3481619"/>
+            <a:ext cx="1048382" cy="2453871"/>
+          </a:xfrm>
+          <a:prstGeom prst="rect">
+            <a:avLst/>
+          </a:prstGeom>
+        </p:spPr>
+      </p:pic>
+      <p:pic>
+        <p:nvPicPr>
+          <p:cNvPr id="26" name="Picture 25">
+            <a:extLst>
+              <a:ext uri="{FF2B5EF4-FFF2-40B4-BE49-F238E27FC236}">
+                <a16:creationId xmlns:a16="http://schemas.microsoft.com/office/drawing/2014/main" id="{E16BF6F1-7C49-4527-82BC-3AAEF1F04758}"/>
+              </a:ext>
+            </a:extLst>
+          </p:cNvPr>
+          <p:cNvPicPr>
+            <a:picLocks noChangeAspect="1"/>
+          </p:cNvPicPr>
+          <p:nvPr/>
+        </p:nvPicPr>
+        <p:blipFill>
+          <a:blip r:embed="rId4"/>
+          <a:stretch>
+            <a:fillRect/>
+          </a:stretch>
+        </p:blipFill>
+        <p:spPr>
+          <a:xfrm>
+            <a:off x="3499802" y="1219200"/>
+            <a:ext cx="1048383" cy="2262419"/>
+          </a:xfrm>
+          <a:prstGeom prst="rect">
+            <a:avLst/>
+          </a:prstGeom>
+        </p:spPr>
+      </p:pic>
+      <p:pic>
+        <p:nvPicPr>
+          <p:cNvPr id="28" name="Picture 27">
+            <a:extLst>
+              <a:ext uri="{FF2B5EF4-FFF2-40B4-BE49-F238E27FC236}">
+                <a16:creationId xmlns:a16="http://schemas.microsoft.com/office/drawing/2014/main" id="{A1BB6796-A63A-4FB4-AF29-1C734463BA9D}"/>
+              </a:ext>
+            </a:extLst>
+          </p:cNvPr>
+          <p:cNvPicPr>
+            <a:picLocks noChangeAspect="1"/>
+          </p:cNvPicPr>
+          <p:nvPr/>
+        </p:nvPicPr>
+        <p:blipFill>
+          <a:blip r:embed="rId5"/>
+          <a:stretch>
+            <a:fillRect/>
+          </a:stretch>
+        </p:blipFill>
+        <p:spPr>
+          <a:xfrm>
+            <a:off x="437233" y="1219200"/>
+            <a:ext cx="3070898" cy="2362200"/>
+          </a:xfrm>
+          <a:prstGeom prst="rect">
+            <a:avLst/>
+          </a:prstGeom>
+        </p:spPr>
+      </p:pic>
+    </p:spTree>
+    <p:extLst>
+      <p:ext uri="{BB962C8B-B14F-4D97-AF65-F5344CB8AC3E}">
+        <p14:creationId xmlns:p14="http://schemas.microsoft.com/office/powerpoint/2010/main" val="2451601799"/>
+      </p:ext>
+    </p:extLst>
+  </p:cSld>
+  <p:clrMapOvr>
+    <a:masterClrMapping/>
+  </p:clrMapOvr>
+</p:sld>
+</file>
+
+<file path=ppt/slides/slide11.xml><?xml version="1.0" encoding="utf-8"?>
+<p:sld xmlns:a="http://schemas.openxmlformats.org/drawingml/2006/main" xmlns:r="http://schemas.openxmlformats.org/officeDocument/2006/relationships" xmlns:p="http://schemas.openxmlformats.org/presentationml/2006/main">
+  <p:cSld>
+    <p:spTree>
+      <p:nvGrpSpPr>
+        <p:cNvPr id="1" name=""/>
+        <p:cNvGrpSpPr/>
+        <p:nvPr/>
+      </p:nvGrpSpPr>
+      <p:grpSpPr>
+        <a:xfrm>
+          <a:off x="0" y="0"/>
+          <a:ext cx="0" cy="0"/>
+          <a:chOff x="0" y="0"/>
+          <a:chExt cx="0" cy="0"/>
+        </a:xfrm>
+      </p:grpSpPr>
+      <p:sp>
+        <p:nvSpPr>
+          <p:cNvPr id="2" name="직사각형 1"/>
+          <p:cNvSpPr/>
+          <p:nvPr/>
+        </p:nvSpPr>
+        <p:spPr>
+          <a:xfrm>
+            <a:off x="6205103" y="1586131"/>
+            <a:ext cx="2634097" cy="461665"/>
+          </a:xfrm>
+          <a:prstGeom prst="rect">
+            <a:avLst/>
+          </a:prstGeom>
+        </p:spPr>
+        <p:txBody>
+          <a:bodyPr wrap="square">
+            <a:spAutoFit/>
+          </a:bodyPr>
+          <a:lstStyle/>
+          <a:p>
+            <a:pPr algn="ctr" eaLnBrk="0" latinLnBrk="0" hangingPunct="0"/>
+            <a:r>
+              <a:rPr lang="en-US" altLang="ko-KR" sz="2400" b="1" dirty="0">
+                <a:latin typeface="맑은 고딕" pitchFamily="50" charset="-127"/>
+                <a:ea typeface="맑은 고딕" pitchFamily="50" charset="-127"/>
+              </a:rPr>
+              <a:t>2020. 10. 28</a:t>
+            </a:r>
+          </a:p>
+        </p:txBody>
+      </p:sp>
+      <p:sp>
+        <p:nvSpPr>
+          <p:cNvPr id="4" name="TextBox 3"/>
+          <p:cNvSpPr txBox="1">
+            <a:spLocks noChangeArrowheads="1"/>
+          </p:cNvSpPr>
+          <p:nvPr/>
+        </p:nvSpPr>
+        <p:spPr bwMode="auto">
+          <a:xfrm>
+            <a:off x="762000" y="914400"/>
+            <a:ext cx="8077200" cy="646331"/>
+          </a:xfrm>
+          <a:prstGeom prst="rect">
+            <a:avLst/>
+          </a:prstGeom>
+          <a:noFill/>
+          <a:ln w="3175">
+            <a:solidFill>
+              <a:schemeClr val="accent6">
+                <a:lumMod val="90000"/>
+                <a:lumOff val="10000"/>
+              </a:schemeClr>
+            </a:solidFill>
+            <a:miter lim="800000"/>
+            <a:headEnd/>
+            <a:tailEnd/>
+          </a:ln>
+        </p:spPr>
+        <p:txBody>
+          <a:bodyPr wrap="square">
+            <a:spAutoFit/>
+          </a:bodyPr>
+          <a:lstStyle/>
+          <a:p>
+            <a:pPr algn="ctr"/>
+            <a:r>
+              <a:rPr lang="en-US" altLang="ko-KR" sz="3600" b="1" dirty="0">
+                <a:latin typeface="+mj-lt"/>
+                <a:ea typeface="HY견명조" panose="02030600000101010101" pitchFamily="18" charset="-127"/>
+              </a:rPr>
+              <a:t>TECHNICAL TEAM</a:t>
+            </a:r>
+          </a:p>
+        </p:txBody>
+      </p:sp>
+      <p:sp>
+        <p:nvSpPr>
+          <p:cNvPr id="5" name="TextBox 4"/>
+          <p:cNvSpPr txBox="1">
+            <a:spLocks noChangeArrowheads="1"/>
+          </p:cNvSpPr>
+          <p:nvPr/>
+        </p:nvSpPr>
+        <p:spPr bwMode="auto">
+          <a:xfrm>
+            <a:off x="2133600" y="5257800"/>
+            <a:ext cx="6324600" cy="584775"/>
+          </a:xfrm>
+          <a:prstGeom prst="rect">
+            <a:avLst/>
+          </a:prstGeom>
+          <a:noFill/>
+          <a:ln w="3175">
+            <a:noFill/>
+            <a:miter lim="800000"/>
+            <a:headEnd/>
+            <a:tailEnd/>
+          </a:ln>
+        </p:spPr>
+        <p:txBody>
+          <a:bodyPr wrap="square">
+            <a:spAutoFit/>
+          </a:bodyPr>
+          <a:lstStyle/>
+          <a:p>
+            <a:pPr algn="ctr"/>
+            <a:r>
+              <a:rPr lang="en-US" altLang="ko-KR" sz="3200" b="1" dirty="0">
+                <a:latin typeface="HY견명조" panose="02030600000101010101" pitchFamily="18" charset="-127"/>
+                <a:ea typeface="HY견명조" panose="02030600000101010101" pitchFamily="18" charset="-127"/>
+              </a:rPr>
+              <a:t>DEV </a:t>
+            </a:r>
+            <a:r>
+              <a:rPr lang="ko-KR" altLang="en-US" sz="3200" b="1" dirty="0">
+                <a:latin typeface="HY견명조" panose="02030600000101010101" pitchFamily="18" charset="-127"/>
+                <a:ea typeface="HY견명조" panose="02030600000101010101" pitchFamily="18" charset="-127"/>
+              </a:rPr>
+              <a:t>제조</a:t>
+            </a:r>
+            <a:r>
+              <a:rPr lang="en-US" altLang="ko-KR" sz="3200" b="1" dirty="0">
+                <a:latin typeface="HY견명조" panose="02030600000101010101" pitchFamily="18" charset="-127"/>
+                <a:ea typeface="HY견명조" panose="02030600000101010101" pitchFamily="18" charset="-127"/>
+              </a:rPr>
+              <a:t>1</a:t>
+            </a:r>
+            <a:r>
+              <a:rPr lang="ko-KR" altLang="en-US" sz="3200" b="1" dirty="0">
+                <a:latin typeface="HY견명조" panose="02030600000101010101" pitchFamily="18" charset="-127"/>
+                <a:ea typeface="HY견명조" panose="02030600000101010101" pitchFamily="18" charset="-127"/>
+              </a:rPr>
+              <a:t>팀</a:t>
+            </a:r>
+            <a:endParaRPr lang="en-US" altLang="ko-KR" sz="3200" b="1" dirty="0">
+              <a:latin typeface="HY견명조" panose="02030600000101010101" pitchFamily="18" charset="-127"/>
+              <a:ea typeface="HY견명조" panose="02030600000101010101" pitchFamily="18" charset="-127"/>
+            </a:endParaRPr>
+          </a:p>
+        </p:txBody>
+      </p:sp>
+      <p:sp>
+        <p:nvSpPr>
+          <p:cNvPr id="3" name="직사각형 1">
+            <a:extLst>
+              <a:ext uri="{FF2B5EF4-FFF2-40B4-BE49-F238E27FC236}">
+                <a16:creationId xmlns:a16="http://schemas.microsoft.com/office/drawing/2014/main" id="{5E64E055-B352-4EB1-8C68-114A458EA7E6}"/>
+              </a:ext>
+            </a:extLst>
+          </p:cNvPr>
+          <p:cNvSpPr/>
+          <p:nvPr/>
+        </p:nvSpPr>
+        <p:spPr>
+          <a:xfrm>
+            <a:off x="6413500" y="3135099"/>
+            <a:ext cx="2634097" cy="461665"/>
+          </a:xfrm>
+          <a:prstGeom prst="rect">
+            <a:avLst/>
+          </a:prstGeom>
+        </p:spPr>
+        <p:txBody>
+          <a:bodyPr wrap="square">
+            <a:spAutoFit/>
+          </a:bodyPr>
+          <a:lstStyle/>
+          <a:p>
+            <a:pPr algn="ctr" eaLnBrk="0" latinLnBrk="0" hangingPunct="0"/>
+            <a:r>
+              <a:rPr lang="en-US" altLang="ko-KR" sz="2400" b="1" dirty="0">
+                <a:latin typeface="맑은 고딕" pitchFamily="50" charset="-127"/>
+                <a:ea typeface="맑은 고딕" pitchFamily="50" charset="-127"/>
+              </a:rPr>
+              <a:t>7199252</a:t>
+            </a:r>
+          </a:p>
+        </p:txBody>
+      </p:sp>
+      <p:sp>
+        <p:nvSpPr>
+          <p:cNvPr id="8" name="직사각형 1">
+            <a:extLst>
+              <a:ext uri="{FF2B5EF4-FFF2-40B4-BE49-F238E27FC236}">
+                <a16:creationId xmlns:a16="http://schemas.microsoft.com/office/drawing/2014/main" id="{68944B4A-87B5-4CC3-86C5-355586E8AD25}"/>
+              </a:ext>
+            </a:extLst>
+          </p:cNvPr>
+          <p:cNvSpPr/>
+          <p:nvPr/>
+        </p:nvSpPr>
+        <p:spPr>
+          <a:xfrm>
+            <a:off x="6400800" y="3622164"/>
+            <a:ext cx="2634097" cy="461665"/>
+          </a:xfrm>
+          <a:prstGeom prst="rect">
+            <a:avLst/>
+          </a:prstGeom>
+        </p:spPr>
+        <p:txBody>
+          <a:bodyPr wrap="square">
+            <a:spAutoFit/>
+          </a:bodyPr>
+          <a:lstStyle/>
+          <a:p>
+            <a:pPr algn="ctr" eaLnBrk="0" latinLnBrk="0" hangingPunct="0"/>
+            <a:r>
+              <a:rPr lang="en-US" altLang="ko-KR" sz="2400" b="1" dirty="0">
+                <a:latin typeface="맑은 고딕" pitchFamily="50" charset="-127"/>
+                <a:ea typeface="맑은 고딕" pitchFamily="50" charset="-127"/>
+              </a:rPr>
+              <a:t>7209115</a:t>
+            </a:r>
+          </a:p>
+        </p:txBody>
+      </p:sp>
+      <p:sp>
+        <p:nvSpPr>
+          <p:cNvPr id="10" name="직사각형 1">
+            <a:extLst>
+              <a:ext uri="{FF2B5EF4-FFF2-40B4-BE49-F238E27FC236}">
+                <a16:creationId xmlns:a16="http://schemas.microsoft.com/office/drawing/2014/main" id="{24DE9080-1BF6-47B5-838F-894F9635BF36}"/>
+              </a:ext>
+            </a:extLst>
+          </p:cNvPr>
+          <p:cNvSpPr/>
+          <p:nvPr/>
+        </p:nvSpPr>
+        <p:spPr>
+          <a:xfrm>
+            <a:off x="4198503" y="3145566"/>
+            <a:ext cx="2634097" cy="461665"/>
+          </a:xfrm>
+          <a:prstGeom prst="rect">
+            <a:avLst/>
+          </a:prstGeom>
+        </p:spPr>
+        <p:txBody>
+          <a:bodyPr wrap="square">
+            <a:spAutoFit/>
+          </a:bodyPr>
+          <a:lstStyle/>
+          <a:p>
+            <a:pPr algn="ctr" eaLnBrk="0" latinLnBrk="0" hangingPunct="0"/>
+            <a:r>
+              <a:rPr lang="en-US" altLang="ko-KR" sz="2400" b="1" dirty="0">
+                <a:latin typeface="맑은 고딕" pitchFamily="50" charset="-127"/>
+                <a:ea typeface="맑은 고딕" pitchFamily="50" charset="-127"/>
+              </a:rPr>
+              <a:t>Pham Gia Tri</a:t>
+            </a:r>
+          </a:p>
+        </p:txBody>
+      </p:sp>
+      <p:sp>
+        <p:nvSpPr>
+          <p:cNvPr id="12" name="직사각형 1">
+            <a:extLst>
+              <a:ext uri="{FF2B5EF4-FFF2-40B4-BE49-F238E27FC236}">
+                <a16:creationId xmlns:a16="http://schemas.microsoft.com/office/drawing/2014/main" id="{8DA58B08-71CB-4973-99F9-5D89997AE76D}"/>
+              </a:ext>
+            </a:extLst>
+          </p:cNvPr>
+          <p:cNvSpPr/>
+          <p:nvPr/>
+        </p:nvSpPr>
+        <p:spPr>
+          <a:xfrm>
+            <a:off x="4185803" y="3632631"/>
+            <a:ext cx="2634097" cy="461665"/>
+          </a:xfrm>
+          <a:prstGeom prst="rect">
+            <a:avLst/>
+          </a:prstGeom>
+        </p:spPr>
+        <p:txBody>
+          <a:bodyPr wrap="square">
+            <a:spAutoFit/>
+          </a:bodyPr>
+          <a:lstStyle/>
+          <a:p>
+            <a:pPr algn="ctr" eaLnBrk="0" latinLnBrk="0" hangingPunct="0"/>
+            <a:r>
+              <a:rPr lang="en-US" altLang="ko-KR" sz="2400" b="1" dirty="0">
+                <a:latin typeface="맑은 고딕" pitchFamily="50" charset="-127"/>
+                <a:ea typeface="맑은 고딕" pitchFamily="50" charset="-127"/>
+              </a:rPr>
+              <a:t>Ho Van Tan</a:t>
+            </a:r>
+          </a:p>
+        </p:txBody>
+      </p:sp>
+    </p:spTree>
+    <p:extLst>
+      <p:ext uri="{BB962C8B-B14F-4D97-AF65-F5344CB8AC3E}">
+        <p14:creationId xmlns:p14="http://schemas.microsoft.com/office/powerpoint/2010/main" val="1406614049"/>
       </p:ext>
     </p:extLst>
   </p:cSld>
@@ -1755,7 +2317,7 @@
         <p:spPr>
           <a:xfrm>
             <a:off x="288634" y="164068"/>
-            <a:ext cx="1433406" cy="400110"/>
+            <a:ext cx="1222899" cy="400110"/>
           </a:xfrm>
           <a:prstGeom prst="rect">
             <a:avLst/>
@@ -1769,16 +2331,8 @@
           <a:lstStyle/>
           <a:p>
             <a:r>
-              <a:rPr lang="vi-VN" sz="2000" b="1" dirty="0">
-                <a:latin typeface="Malgun Gothic (Headings)"/>
-              </a:rPr>
-              <a:t>C</a:t>
-            </a:r>
-            <a:r>
-              <a:rPr lang="en-US" sz="2000" b="1" dirty="0" err="1">
-                <a:latin typeface="+mj-lt"/>
-              </a:rPr>
-              <a:t>atalogue</a:t>
+              <a:rPr lang="en-US" sz="2000" dirty="0"/>
+              <a:t>Contents</a:t>
             </a:r>
             <a:endParaRPr lang="en-US" sz="2000" b="1" dirty="0">
               <a:latin typeface="+mj-lt"/>
@@ -1786,116 +2340,36 @@
           </a:p>
         </p:txBody>
       </p:sp>
-      <p:sp>
-        <p:nvSpPr>
-          <p:cNvPr id="5" name="TextBox 4">
+      <p:pic>
+        <p:nvPicPr>
+          <p:cNvPr id="9" name="Picture 8">
             <a:extLst>
               <a:ext uri="{FF2B5EF4-FFF2-40B4-BE49-F238E27FC236}">
-                <a16:creationId xmlns:a16="http://schemas.microsoft.com/office/drawing/2014/main" id="{412A2F91-0C76-4B72-97F6-0533A6C8B964}"/>
+                <a16:creationId xmlns:a16="http://schemas.microsoft.com/office/drawing/2014/main" id="{D2A3F5AD-66B8-402F-980C-D93336BF1AA3}"/>
               </a:ext>
             </a:extLst>
           </p:cNvPr>
-          <p:cNvSpPr txBox="1"/>
-          <p:nvPr/>
-        </p:nvSpPr>
-        <p:spPr>
-          <a:xfrm>
-            <a:off x="1213894" y="2349043"/>
-            <a:ext cx="6629400" cy="2308324"/>
-          </a:xfrm>
-          <a:prstGeom prst="rect">
-            <a:avLst/>
-          </a:prstGeom>
-          <a:noFill/>
-        </p:spPr>
-        <p:txBody>
-          <a:bodyPr wrap="square" rtlCol="0">
-            <a:spAutoFit/>
-          </a:bodyPr>
-          <a:lstStyle/>
-          <a:p>
-            <a:pPr marL="342900" indent="-342900">
-              <a:buFont typeface="+mj-lt"/>
-              <a:buAutoNum type="arabicPeriod"/>
-            </a:pPr>
-            <a:r>
-              <a:rPr lang="vi-VN" dirty="0"/>
-              <a:t>Block diagram</a:t>
-            </a:r>
-          </a:p>
-          <a:p>
-            <a:pPr marL="342900" indent="-342900">
-              <a:buFont typeface="+mj-lt"/>
-              <a:buAutoNum type="arabicPeriod"/>
-            </a:pPr>
-            <a:r>
-              <a:rPr lang="vi-VN" dirty="0"/>
-              <a:t>Software</a:t>
-            </a:r>
-          </a:p>
-          <a:p>
-            <a:pPr marL="800100" lvl="1" indent="-342900">
-              <a:buFont typeface="+mj-lt"/>
-              <a:buAutoNum type="alphaLcParenR"/>
-            </a:pPr>
-            <a:r>
-              <a:rPr lang="vi-VN" dirty="0"/>
-              <a:t>User interface</a:t>
-            </a:r>
-          </a:p>
-          <a:p>
-            <a:pPr marL="800100" lvl="1" indent="-342900">
-              <a:buFont typeface="+mj-lt"/>
-              <a:buAutoNum type="alphaLcParenR"/>
-            </a:pPr>
-            <a:r>
-              <a:rPr lang="vi-VN" dirty="0"/>
-              <a:t>Software main function</a:t>
-            </a:r>
-          </a:p>
-          <a:p>
-            <a:pPr marL="800100" lvl="1" indent="-342900">
-              <a:buFont typeface="+mj-lt"/>
-              <a:buAutoNum type="alphaLcParenR"/>
-            </a:pPr>
-            <a:r>
-              <a:rPr lang="vi-VN" dirty="0"/>
-              <a:t>Setting/creat model</a:t>
-            </a:r>
-          </a:p>
-          <a:p>
-            <a:pPr marL="800100" lvl="1" indent="-342900">
-              <a:buFont typeface="+mj-lt"/>
-              <a:buAutoNum type="alphaLcParenR"/>
-            </a:pPr>
-            <a:r>
-              <a:rPr lang="vi-VN" dirty="0"/>
-              <a:t>Report manager</a:t>
-            </a:r>
-          </a:p>
-          <a:p>
-            <a:pPr marL="342900" indent="-342900">
-              <a:buFont typeface="+mj-lt"/>
-              <a:buAutoNum type="arabicPeriod"/>
-            </a:pPr>
-            <a:r>
-              <a:rPr lang="vi-VN" dirty="0"/>
-              <a:t>Arduino controller board</a:t>
-            </a:r>
-          </a:p>
-          <a:p>
-            <a:pPr marL="342900" indent="-342900">
-              <a:buFont typeface="+mj-lt"/>
-              <a:buAutoNum type="arabicPeriod"/>
-            </a:pPr>
-            <a:r>
-              <a:rPr lang="vi-VN" dirty="0"/>
-              <a:t>Conveyor</a:t>
-            </a:r>
-            <a:endParaRPr lang="en-US" dirty="0"/>
-          </a:p>
-        </p:txBody>
-      </p:sp>
+          <p:cNvPicPr>
+            <a:picLocks noChangeAspect="1"/>
+          </p:cNvPicPr>
+          <p:nvPr/>
+        </p:nvPicPr>
+        <p:blipFill>
+          <a:blip r:embed="rId2"/>
+          <a:stretch>
+            <a:fillRect/>
+          </a:stretch>
+        </p:blipFill>
+        <p:spPr>
+          <a:xfrm>
+            <a:off x="288634" y="811180"/>
+            <a:ext cx="9312566" cy="5627720"/>
+          </a:xfrm>
+          <a:prstGeom prst="rect">
+            <a:avLst/>
+          </a:prstGeom>
+        </p:spPr>
+      </p:pic>
       <p:pic>
         <p:nvPicPr>
           <p:cNvPr id="8" name="Picture 7">
@@ -1911,7 +2385,7 @@
           <p:nvPr/>
         </p:nvPicPr>
         <p:blipFill>
-          <a:blip r:embed="rId2">
+          <a:blip r:embed="rId3">
             <a:extLst>
               <a:ext uri="{28A0092B-C50C-407E-A947-70E740481C1C}">
                 <a14:useLocalDpi xmlns:a14="http://schemas.microsoft.com/office/drawing/2010/main" val="0"/>
@@ -1924,14 +2398,68 @@
         </p:blipFill>
         <p:spPr>
           <a:xfrm>
-            <a:off x="5357813" y="1664493"/>
-            <a:ext cx="3529013" cy="3529013"/>
+            <a:off x="6781800" y="611221"/>
+            <a:ext cx="2459356" cy="2459356"/>
           </a:xfrm>
           <a:prstGeom prst="rect">
             <a:avLst/>
           </a:prstGeom>
         </p:spPr>
       </p:pic>
+      <p:sp>
+        <p:nvSpPr>
+          <p:cNvPr id="12" name="Rectangle 11">
+            <a:extLst>
+              <a:ext uri="{FF2B5EF4-FFF2-40B4-BE49-F238E27FC236}">
+                <a16:creationId xmlns:a16="http://schemas.microsoft.com/office/drawing/2014/main" id="{12879193-9FF8-4E81-9A13-BAFCD93DB77C}"/>
+              </a:ext>
+            </a:extLst>
+          </p:cNvPr>
+          <p:cNvSpPr/>
+          <p:nvPr/>
+        </p:nvSpPr>
+        <p:spPr>
+          <a:xfrm>
+            <a:off x="457200" y="5638801"/>
+            <a:ext cx="992450" cy="761999"/>
+          </a:xfrm>
+          <a:prstGeom prst="rect">
+            <a:avLst/>
+          </a:prstGeom>
+          <a:solidFill>
+            <a:schemeClr val="bg1"/>
+          </a:solidFill>
+          <a:ln>
+            <a:solidFill>
+              <a:schemeClr val="bg1"/>
+            </a:solidFill>
+          </a:ln>
+        </p:spPr>
+        <p:style>
+          <a:lnRef idx="2">
+            <a:schemeClr val="accent1">
+              <a:shade val="50000"/>
+            </a:schemeClr>
+          </a:lnRef>
+          <a:fillRef idx="1">
+            <a:schemeClr val="accent1"/>
+          </a:fillRef>
+          <a:effectRef idx="0">
+            <a:schemeClr val="accent1"/>
+          </a:effectRef>
+          <a:fontRef idx="minor">
+            <a:schemeClr val="lt1"/>
+          </a:fontRef>
+        </p:style>
+        <p:txBody>
+          <a:bodyPr rtlCol="0" anchor="ctr"/>
+          <a:lstStyle/>
+          <a:p>
+            <a:pPr algn="ctr"/>
+            <a:endParaRPr lang="en-US"/>
+          </a:p>
+        </p:txBody>
+      </p:sp>
     </p:spTree>
     <p:extLst>
       <p:ext uri="{BB962C8B-B14F-4D97-AF65-F5344CB8AC3E}">
@@ -2068,7 +2596,7 @@
         </p:blipFill>
         <p:spPr>
           <a:xfrm>
-            <a:off x="1441967" y="838200"/>
+            <a:off x="2549189" y="838200"/>
             <a:ext cx="7022066" cy="5623032"/>
           </a:xfrm>
           <a:prstGeom prst="rect">
@@ -2090,7 +2618,7 @@
         </p:nvSpPr>
         <p:spPr>
           <a:xfrm>
-            <a:off x="2392094" y="4724400"/>
+            <a:off x="3499316" y="4724400"/>
             <a:ext cx="4923105" cy="1200329"/>
           </a:xfrm>
           <a:prstGeom prst="rect">
@@ -2249,36 +2777,6 @@
           </a:p>
         </p:txBody>
       </p:sp>
-      <p:pic>
-        <p:nvPicPr>
-          <p:cNvPr id="5" name="Picture 4">
-            <a:extLst>
-              <a:ext uri="{FF2B5EF4-FFF2-40B4-BE49-F238E27FC236}">
-                <a16:creationId xmlns:a16="http://schemas.microsoft.com/office/drawing/2014/main" id="{977ED1B6-BACE-4325-8AE4-527883ADA485}"/>
-              </a:ext>
-            </a:extLst>
-          </p:cNvPr>
-          <p:cNvPicPr>
-            <a:picLocks noChangeAspect="1"/>
-          </p:cNvPicPr>
-          <p:nvPr/>
-        </p:nvPicPr>
-        <p:blipFill>
-          <a:blip r:embed="rId2"/>
-          <a:stretch>
-            <a:fillRect/>
-          </a:stretch>
-        </p:blipFill>
-        <p:spPr>
-          <a:xfrm>
-            <a:off x="228600" y="1371600"/>
-            <a:ext cx="9448800" cy="4756740"/>
-          </a:xfrm>
-          <a:prstGeom prst="rect">
-            <a:avLst/>
-          </a:prstGeom>
-        </p:spPr>
-      </p:pic>
       <p:sp>
         <p:nvSpPr>
           <p:cNvPr id="7" name="TextBox 6">
@@ -2319,645 +2817,42 @@
           </a:p>
         </p:txBody>
       </p:sp>
-      <p:sp>
-        <p:nvSpPr>
-          <p:cNvPr id="8" name="TextBox 7">
+      <p:pic>
+        <p:nvPicPr>
+          <p:cNvPr id="6" name="Picture 5">
             <a:extLst>
               <a:ext uri="{FF2B5EF4-FFF2-40B4-BE49-F238E27FC236}">
-                <a16:creationId xmlns:a16="http://schemas.microsoft.com/office/drawing/2014/main" id="{161F9A2E-6A96-425C-A98A-3B643C1E2723}"/>
+                <a16:creationId xmlns:a16="http://schemas.microsoft.com/office/drawing/2014/main" id="{6BCE8E25-9D9B-47A5-9484-8D81ED7ECC21}"/>
               </a:ext>
             </a:extLst>
           </p:cNvPr>
-          <p:cNvSpPr txBox="1"/>
-          <p:nvPr/>
-        </p:nvSpPr>
-        <p:spPr>
-          <a:xfrm>
-            <a:off x="7543800" y="2514600"/>
-            <a:ext cx="914400" cy="369332"/>
-          </a:xfrm>
-          <a:prstGeom prst="rect">
-            <a:avLst/>
-          </a:prstGeom>
-        </p:spPr>
-        <p:style>
-          <a:lnRef idx="3">
-            <a:schemeClr val="lt1"/>
-          </a:lnRef>
-          <a:fillRef idx="1">
-            <a:schemeClr val="accent4"/>
-          </a:fillRef>
-          <a:effectRef idx="1">
-            <a:schemeClr val="accent4"/>
-          </a:effectRef>
-          <a:fontRef idx="minor">
-            <a:schemeClr val="lt1"/>
-          </a:fontRef>
-        </p:style>
-        <p:txBody>
-          <a:bodyPr wrap="square" rtlCol="0">
-            <a:spAutoFit/>
-          </a:bodyPr>
-          <a:lstStyle/>
-          <a:p>
-            <a:r>
-              <a:rPr lang="vi-VN" dirty="0">
-                <a:solidFill>
-                  <a:schemeClr val="bg1"/>
-                </a:solidFill>
-                <a:effectLst>
-                  <a:outerShdw blurRad="38100" dist="38100" dir="2700000" algn="tl">
-                    <a:srgbClr val="000000">
-                      <a:alpha val="43137"/>
-                    </a:srgbClr>
-                  </a:outerShdw>
-                </a:effectLst>
-              </a:rPr>
-              <a:t>History</a:t>
-            </a:r>
-            <a:endParaRPr lang="en-US" dirty="0">
-              <a:solidFill>
-                <a:schemeClr val="bg1"/>
-              </a:solidFill>
-              <a:effectLst>
-                <a:outerShdw blurRad="38100" dist="38100" dir="2700000" algn="tl">
-                  <a:srgbClr val="000000">
-                    <a:alpha val="43137"/>
-                  </a:srgbClr>
-                </a:outerShdw>
-              </a:effectLst>
-            </a:endParaRPr>
-          </a:p>
-        </p:txBody>
-      </p:sp>
-      <p:sp>
-        <p:nvSpPr>
-          <p:cNvPr id="10" name="TextBox 9">
+          <p:cNvPicPr>
+            <a:picLocks noChangeAspect="1"/>
+          </p:cNvPicPr>
+          <p:nvPr/>
+        </p:nvPicPr>
+        <p:blipFill>
+          <a:blip r:embed="rId2">
             <a:extLst>
-              <a:ext uri="{FF2B5EF4-FFF2-40B4-BE49-F238E27FC236}">
-                <a16:creationId xmlns:a16="http://schemas.microsoft.com/office/drawing/2014/main" id="{6591D583-2A5F-4EAE-B9D0-D3A6A9AFF8F9}"/>
+              <a:ext uri="{28A0092B-C50C-407E-A947-70E740481C1C}">
+                <a14:useLocalDpi xmlns:a14="http://schemas.microsoft.com/office/drawing/2010/main" val="0"/>
               </a:ext>
             </a:extLst>
-          </p:cNvPr>
-          <p:cNvSpPr txBox="1"/>
-          <p:nvPr/>
-        </p:nvSpPr>
-        <p:spPr>
-          <a:xfrm>
-            <a:off x="4090987" y="4953000"/>
-            <a:ext cx="1090614" cy="369332"/>
-          </a:xfrm>
-          <a:prstGeom prst="rect">
-            <a:avLst/>
-          </a:prstGeom>
-        </p:spPr>
-        <p:style>
-          <a:lnRef idx="3">
-            <a:schemeClr val="lt1"/>
-          </a:lnRef>
-          <a:fillRef idx="1">
-            <a:schemeClr val="accent4"/>
-          </a:fillRef>
-          <a:effectRef idx="1">
-            <a:schemeClr val="accent4"/>
-          </a:effectRef>
-          <a:fontRef idx="minor">
-            <a:schemeClr val="lt1"/>
-          </a:fontRef>
-        </p:style>
-        <p:txBody>
-          <a:bodyPr wrap="square" rtlCol="0">
-            <a:spAutoFit/>
-          </a:bodyPr>
-          <a:lstStyle/>
-          <a:p>
-            <a:r>
-              <a:rPr lang="vi-VN" dirty="0">
-                <a:solidFill>
-                  <a:schemeClr val="bg1"/>
-                </a:solidFill>
-                <a:effectLst>
-                  <a:outerShdw blurRad="38100" dist="38100" dir="2700000" algn="tl">
-                    <a:srgbClr val="000000">
-                      <a:alpha val="43137"/>
-                    </a:srgbClr>
-                  </a:outerShdw>
-                </a:effectLst>
-              </a:rPr>
-              <a:t>QR code</a:t>
-            </a:r>
-            <a:endParaRPr lang="en-US" dirty="0">
-              <a:solidFill>
-                <a:schemeClr val="bg1"/>
-              </a:solidFill>
-              <a:effectLst>
-                <a:outerShdw blurRad="38100" dist="38100" dir="2700000" algn="tl">
-                  <a:srgbClr val="000000">
-                    <a:alpha val="43137"/>
-                  </a:srgbClr>
-                </a:outerShdw>
-              </a:effectLst>
-            </a:endParaRPr>
-          </a:p>
-        </p:txBody>
-      </p:sp>
-      <p:sp>
-        <p:nvSpPr>
-          <p:cNvPr id="12" name="TextBox 11">
-            <a:extLst>
-              <a:ext uri="{FF2B5EF4-FFF2-40B4-BE49-F238E27FC236}">
-                <a16:creationId xmlns:a16="http://schemas.microsoft.com/office/drawing/2014/main" id="{F616119D-6751-4C90-8557-7DAFA942C9CB}"/>
-              </a:ext>
-            </a:extLst>
-          </p:cNvPr>
-          <p:cNvSpPr txBox="1"/>
-          <p:nvPr/>
-        </p:nvSpPr>
-        <p:spPr>
-          <a:xfrm>
-            <a:off x="455509" y="2329934"/>
-            <a:ext cx="1190897" cy="369332"/>
-          </a:xfrm>
-          <a:prstGeom prst="rect">
-            <a:avLst/>
-          </a:prstGeom>
-        </p:spPr>
-        <p:style>
-          <a:lnRef idx="3">
-            <a:schemeClr val="lt1"/>
-          </a:lnRef>
-          <a:fillRef idx="1">
-            <a:schemeClr val="accent4"/>
-          </a:fillRef>
-          <a:effectRef idx="1">
-            <a:schemeClr val="accent4"/>
-          </a:effectRef>
-          <a:fontRef idx="minor">
-            <a:schemeClr val="lt1"/>
-          </a:fontRef>
-        </p:style>
-        <p:txBody>
-          <a:bodyPr wrap="square" rtlCol="0">
-            <a:spAutoFit/>
-          </a:bodyPr>
-          <a:lstStyle/>
-          <a:p>
-            <a:r>
-              <a:rPr lang="vi-VN" dirty="0">
-                <a:solidFill>
-                  <a:schemeClr val="bg1"/>
-                </a:solidFill>
-                <a:effectLst>
-                  <a:outerShdw blurRad="38100" dist="38100" dir="2700000" algn="tl">
-                    <a:srgbClr val="000000">
-                      <a:alpha val="43137"/>
-                    </a:srgbClr>
-                  </a:outerShdw>
-                </a:effectLst>
-              </a:rPr>
-              <a:t>Statistical</a:t>
-            </a:r>
-            <a:endParaRPr lang="en-US" dirty="0">
-              <a:solidFill>
-                <a:schemeClr val="bg1"/>
-              </a:solidFill>
-              <a:effectLst>
-                <a:outerShdw blurRad="38100" dist="38100" dir="2700000" algn="tl">
-                  <a:srgbClr val="000000">
-                    <a:alpha val="43137"/>
-                  </a:srgbClr>
-                </a:outerShdw>
-              </a:effectLst>
-            </a:endParaRPr>
-          </a:p>
-        </p:txBody>
-      </p:sp>
-      <p:sp>
-        <p:nvSpPr>
-          <p:cNvPr id="14" name="TextBox 13">
-            <a:extLst>
-              <a:ext uri="{FF2B5EF4-FFF2-40B4-BE49-F238E27FC236}">
-                <a16:creationId xmlns:a16="http://schemas.microsoft.com/office/drawing/2014/main" id="{7B5FF5F3-E02B-4C93-83EF-7D1F27F95EC8}"/>
-              </a:ext>
-            </a:extLst>
-          </p:cNvPr>
-          <p:cNvSpPr txBox="1"/>
-          <p:nvPr/>
-        </p:nvSpPr>
-        <p:spPr>
-          <a:xfrm>
-            <a:off x="4548187" y="2699266"/>
-            <a:ext cx="1764506" cy="369332"/>
-          </a:xfrm>
-          <a:prstGeom prst="rect">
-            <a:avLst/>
-          </a:prstGeom>
-        </p:spPr>
-        <p:style>
-          <a:lnRef idx="3">
-            <a:schemeClr val="lt1"/>
-          </a:lnRef>
-          <a:fillRef idx="1">
-            <a:schemeClr val="accent4"/>
-          </a:fillRef>
-          <a:effectRef idx="1">
-            <a:schemeClr val="accent4"/>
-          </a:effectRef>
-          <a:fontRef idx="minor">
-            <a:schemeClr val="lt1"/>
-          </a:fontRef>
-        </p:style>
-        <p:txBody>
-          <a:bodyPr wrap="square" rtlCol="0">
-            <a:spAutoFit/>
-          </a:bodyPr>
-          <a:lstStyle/>
-          <a:p>
-            <a:r>
-              <a:rPr lang="vi-VN" dirty="0">
-                <a:solidFill>
-                  <a:schemeClr val="bg1"/>
-                </a:solidFill>
-                <a:effectLst>
-                  <a:outerShdw blurRad="38100" dist="38100" dir="2700000" algn="tl">
-                    <a:srgbClr val="000000">
-                      <a:alpha val="43137"/>
-                    </a:srgbClr>
-                  </a:outerShdw>
-                </a:effectLst>
-              </a:rPr>
-              <a:t>Machine layout</a:t>
-            </a:r>
-            <a:endParaRPr lang="en-US" dirty="0">
-              <a:solidFill>
-                <a:schemeClr val="bg1"/>
-              </a:solidFill>
-              <a:effectLst>
-                <a:outerShdw blurRad="38100" dist="38100" dir="2700000" algn="tl">
-                  <a:srgbClr val="000000">
-                    <a:alpha val="43137"/>
-                  </a:srgbClr>
-                </a:outerShdw>
-              </a:effectLst>
-            </a:endParaRPr>
-          </a:p>
-        </p:txBody>
-      </p:sp>
-      <p:sp>
-        <p:nvSpPr>
-          <p:cNvPr id="16" name="TextBox 15">
-            <a:extLst>
-              <a:ext uri="{FF2B5EF4-FFF2-40B4-BE49-F238E27FC236}">
-                <a16:creationId xmlns:a16="http://schemas.microsoft.com/office/drawing/2014/main" id="{10AD11BC-66C5-4367-9264-F654FE1D5F96}"/>
-              </a:ext>
-            </a:extLst>
-          </p:cNvPr>
-          <p:cNvSpPr txBox="1"/>
-          <p:nvPr/>
-        </p:nvSpPr>
-        <p:spPr>
-          <a:xfrm>
-            <a:off x="7541622" y="5410200"/>
-            <a:ext cx="1221377" cy="369332"/>
-          </a:xfrm>
-          <a:prstGeom prst="rect">
-            <a:avLst/>
-          </a:prstGeom>
-        </p:spPr>
-        <p:style>
-          <a:lnRef idx="3">
-            <a:schemeClr val="lt1"/>
-          </a:lnRef>
-          <a:fillRef idx="1">
-            <a:schemeClr val="accent4"/>
-          </a:fillRef>
-          <a:effectRef idx="1">
-            <a:schemeClr val="accent4"/>
-          </a:effectRef>
-          <a:fontRef idx="minor">
-            <a:schemeClr val="lt1"/>
-          </a:fontRef>
-        </p:style>
-        <p:txBody>
-          <a:bodyPr wrap="square" rtlCol="0">
-            <a:spAutoFit/>
-          </a:bodyPr>
-          <a:lstStyle/>
-          <a:p>
-            <a:r>
-              <a:rPr lang="vi-VN" dirty="0">
-                <a:solidFill>
-                  <a:schemeClr val="bg1"/>
-                </a:solidFill>
-                <a:effectLst>
-                  <a:outerShdw blurRad="38100" dist="38100" dir="2700000" algn="tl">
-                    <a:srgbClr val="000000">
-                      <a:alpha val="43137"/>
-                    </a:srgbClr>
-                  </a:outerShdw>
-                </a:effectLst>
-              </a:rPr>
-              <a:t>Elnec info</a:t>
-            </a:r>
-            <a:endParaRPr lang="en-US" dirty="0">
-              <a:solidFill>
-                <a:schemeClr val="bg1"/>
-              </a:solidFill>
-              <a:effectLst>
-                <a:outerShdw blurRad="38100" dist="38100" dir="2700000" algn="tl">
-                  <a:srgbClr val="000000">
-                    <a:alpha val="43137"/>
-                  </a:srgbClr>
-                </a:outerShdw>
-              </a:effectLst>
-            </a:endParaRPr>
-          </a:p>
-        </p:txBody>
-      </p:sp>
-      <p:sp>
-        <p:nvSpPr>
-          <p:cNvPr id="18" name="TextBox 17">
-            <a:extLst>
-              <a:ext uri="{FF2B5EF4-FFF2-40B4-BE49-F238E27FC236}">
-                <a16:creationId xmlns:a16="http://schemas.microsoft.com/office/drawing/2014/main" id="{A7BA4298-374A-4BB5-A554-E10036495EFF}"/>
-              </a:ext>
-            </a:extLst>
-          </p:cNvPr>
-          <p:cNvSpPr txBox="1"/>
-          <p:nvPr/>
-        </p:nvSpPr>
-        <p:spPr>
-          <a:xfrm>
-            <a:off x="631011" y="3657600"/>
-            <a:ext cx="839891" cy="369332"/>
-          </a:xfrm>
-          <a:prstGeom prst="rect">
-            <a:avLst/>
-          </a:prstGeom>
-        </p:spPr>
-        <p:style>
-          <a:lnRef idx="3">
-            <a:schemeClr val="lt1"/>
-          </a:lnRef>
-          <a:fillRef idx="1">
-            <a:schemeClr val="accent4"/>
-          </a:fillRef>
-          <a:effectRef idx="1">
-            <a:schemeClr val="accent4"/>
-          </a:effectRef>
-          <a:fontRef idx="minor">
-            <a:schemeClr val="lt1"/>
-          </a:fontRef>
-        </p:style>
-        <p:txBody>
-          <a:bodyPr wrap="square" rtlCol="0">
-            <a:spAutoFit/>
-          </a:bodyPr>
-          <a:lstStyle/>
-          <a:p>
-            <a:r>
-              <a:rPr lang="vi-VN">
-                <a:solidFill>
-                  <a:schemeClr val="bg1"/>
-                </a:solidFill>
-                <a:effectLst>
-                  <a:outerShdw blurRad="38100" dist="38100" dir="2700000" algn="tl">
-                    <a:srgbClr val="000000">
-                      <a:alpha val="43137"/>
-                    </a:srgbClr>
-                  </a:outerShdw>
-                </a:effectLst>
-              </a:rPr>
-              <a:t>Result</a:t>
-            </a:r>
-            <a:endParaRPr lang="en-US" dirty="0">
-              <a:solidFill>
-                <a:schemeClr val="bg1"/>
-              </a:solidFill>
-              <a:effectLst>
-                <a:outerShdw blurRad="38100" dist="38100" dir="2700000" algn="tl">
-                  <a:srgbClr val="000000">
-                    <a:alpha val="43137"/>
-                  </a:srgbClr>
-                </a:outerShdw>
-              </a:effectLst>
-            </a:endParaRPr>
-          </a:p>
-        </p:txBody>
-      </p:sp>
-      <p:sp>
-        <p:nvSpPr>
-          <p:cNvPr id="20" name="TextBox 19">
-            <a:extLst>
-              <a:ext uri="{FF2B5EF4-FFF2-40B4-BE49-F238E27FC236}">
-                <a16:creationId xmlns:a16="http://schemas.microsoft.com/office/drawing/2014/main" id="{08A10689-EB02-4842-B25F-477DABB669A3}"/>
-              </a:ext>
-            </a:extLst>
-          </p:cNvPr>
-          <p:cNvSpPr txBox="1"/>
-          <p:nvPr/>
-        </p:nvSpPr>
-        <p:spPr>
-          <a:xfrm>
-            <a:off x="1558901" y="4583668"/>
-            <a:ext cx="1221377" cy="369332"/>
-          </a:xfrm>
-          <a:prstGeom prst="rect">
-            <a:avLst/>
-          </a:prstGeom>
-        </p:spPr>
-        <p:style>
-          <a:lnRef idx="3">
-            <a:schemeClr val="lt1"/>
-          </a:lnRef>
-          <a:fillRef idx="1">
-            <a:schemeClr val="accent4"/>
-          </a:fillRef>
-          <a:effectRef idx="1">
-            <a:schemeClr val="accent4"/>
-          </a:effectRef>
-          <a:fontRef idx="minor">
-            <a:schemeClr val="lt1"/>
-          </a:fontRef>
-        </p:style>
-        <p:txBody>
-          <a:bodyPr wrap="square" rtlCol="0">
-            <a:spAutoFit/>
-          </a:bodyPr>
-          <a:lstStyle/>
-          <a:p>
-            <a:r>
-              <a:rPr lang="vi-VN" dirty="0">
-                <a:solidFill>
-                  <a:schemeClr val="bg1"/>
-                </a:solidFill>
-                <a:effectLst>
-                  <a:outerShdw blurRad="38100" dist="38100" dir="2700000" algn="tl">
-                    <a:srgbClr val="000000">
-                      <a:alpha val="43137"/>
-                    </a:srgbClr>
-                  </a:outerShdw>
-                </a:effectLst>
-              </a:rPr>
-              <a:t>ROM info</a:t>
-            </a:r>
-            <a:endParaRPr lang="en-US" dirty="0">
-              <a:solidFill>
-                <a:schemeClr val="bg1"/>
-              </a:solidFill>
-              <a:effectLst>
-                <a:outerShdw blurRad="38100" dist="38100" dir="2700000" algn="tl">
-                  <a:srgbClr val="000000">
-                    <a:alpha val="43137"/>
-                  </a:srgbClr>
-                </a:outerShdw>
-              </a:effectLst>
-            </a:endParaRPr>
-          </a:p>
-        </p:txBody>
-      </p:sp>
-      <p:sp>
-        <p:nvSpPr>
-          <p:cNvPr id="22" name="TextBox 21">
-            <a:extLst>
-              <a:ext uri="{FF2B5EF4-FFF2-40B4-BE49-F238E27FC236}">
-                <a16:creationId xmlns:a16="http://schemas.microsoft.com/office/drawing/2014/main" id="{3DAE9E1D-DEB0-4395-BA57-2CAE7022045A}"/>
-              </a:ext>
-            </a:extLst>
-          </p:cNvPr>
-          <p:cNvSpPr txBox="1"/>
-          <p:nvPr/>
-        </p:nvSpPr>
-        <p:spPr>
-          <a:xfrm>
-            <a:off x="1981201" y="5507873"/>
-            <a:ext cx="1066800" cy="369332"/>
-          </a:xfrm>
-          <a:prstGeom prst="rect">
-            <a:avLst/>
-          </a:prstGeom>
-        </p:spPr>
-        <p:style>
-          <a:lnRef idx="3">
-            <a:schemeClr val="lt1"/>
-          </a:lnRef>
-          <a:fillRef idx="1">
-            <a:schemeClr val="accent4"/>
-          </a:fillRef>
-          <a:effectRef idx="1">
-            <a:schemeClr val="accent4"/>
-          </a:effectRef>
-          <a:fontRef idx="minor">
-            <a:schemeClr val="lt1"/>
-          </a:fontRef>
-        </p:style>
-        <p:txBody>
-          <a:bodyPr wrap="square" rtlCol="0">
-            <a:spAutoFit/>
-          </a:bodyPr>
-          <a:lstStyle/>
-          <a:p>
-            <a:r>
-              <a:rPr lang="vi-VN" dirty="0">
-                <a:solidFill>
-                  <a:schemeClr val="bg1"/>
-                </a:solidFill>
-                <a:effectLst>
-                  <a:outerShdw blurRad="38100" dist="38100" dir="2700000" algn="tl">
-                    <a:srgbClr val="000000">
-                      <a:alpha val="43137"/>
-                    </a:srgbClr>
-                  </a:outerShdw>
-                </a:effectLst>
-              </a:rPr>
-              <a:t>Step run</a:t>
-            </a:r>
-            <a:endParaRPr lang="en-US" dirty="0">
-              <a:solidFill>
-                <a:schemeClr val="bg1"/>
-              </a:solidFill>
-              <a:effectLst>
-                <a:outerShdw blurRad="38100" dist="38100" dir="2700000" algn="tl">
-                  <a:srgbClr val="000000">
-                    <a:alpha val="43137"/>
-                  </a:srgbClr>
-                </a:outerShdw>
-              </a:effectLst>
-            </a:endParaRPr>
-          </a:p>
-        </p:txBody>
-      </p:sp>
-      <p:sp>
-        <p:nvSpPr>
-          <p:cNvPr id="28" name="TextBox 27">
-            <a:extLst>
-              <a:ext uri="{FF2B5EF4-FFF2-40B4-BE49-F238E27FC236}">
-                <a16:creationId xmlns:a16="http://schemas.microsoft.com/office/drawing/2014/main" id="{4859D00E-A1BB-4B23-904A-8D397432CA9A}"/>
-              </a:ext>
-            </a:extLst>
-          </p:cNvPr>
-          <p:cNvSpPr txBox="1"/>
-          <p:nvPr/>
-        </p:nvSpPr>
-        <p:spPr>
-          <a:xfrm>
-            <a:off x="838200" y="1220132"/>
-            <a:ext cx="1066800" cy="369332"/>
-          </a:xfrm>
-          <a:prstGeom prst="rect">
-            <a:avLst/>
-          </a:prstGeom>
-        </p:spPr>
-        <p:style>
-          <a:lnRef idx="3">
-            <a:schemeClr val="lt1"/>
-          </a:lnRef>
-          <a:fillRef idx="1">
-            <a:schemeClr val="accent4"/>
-          </a:fillRef>
-          <a:effectRef idx="1">
-            <a:schemeClr val="accent4"/>
-          </a:effectRef>
-          <a:fontRef idx="minor">
-            <a:schemeClr val="lt1"/>
-          </a:fontRef>
-        </p:style>
-        <p:txBody>
-          <a:bodyPr wrap="square" rtlCol="0">
-            <a:spAutoFit/>
-          </a:bodyPr>
-          <a:lstStyle/>
-          <a:p>
-            <a:r>
-              <a:rPr lang="vi-VN" dirty="0">
-                <a:solidFill>
-                  <a:schemeClr val="bg1"/>
-                </a:solidFill>
-                <a:effectLst>
-                  <a:outerShdw blurRad="38100" dist="38100" dir="2700000" algn="tl">
-                    <a:srgbClr val="000000">
-                      <a:alpha val="43137"/>
-                    </a:srgbClr>
-                  </a:outerShdw>
-                </a:effectLst>
-              </a:rPr>
-              <a:t>Toolbar</a:t>
-            </a:r>
-            <a:endParaRPr lang="en-US" dirty="0">
-              <a:solidFill>
-                <a:schemeClr val="bg1"/>
-              </a:solidFill>
-              <a:effectLst>
-                <a:outerShdw blurRad="38100" dist="38100" dir="2700000" algn="tl">
-                  <a:srgbClr val="000000">
-                    <a:alpha val="43137"/>
-                  </a:srgbClr>
-                </a:outerShdw>
-              </a:effectLst>
-            </a:endParaRPr>
-          </a:p>
-        </p:txBody>
-      </p:sp>
+          </a:blip>
+          <a:stretch>
+            <a:fillRect/>
+          </a:stretch>
+        </p:blipFill>
+        <p:spPr>
+          <a:xfrm>
+            <a:off x="0" y="930938"/>
+            <a:ext cx="9906000" cy="4996123"/>
+          </a:xfrm>
+          <a:prstGeom prst="rect">
+            <a:avLst/>
+          </a:prstGeom>
+        </p:spPr>
+      </p:pic>
     </p:spTree>
     <p:extLst>
       <p:ext uri="{BB962C8B-B14F-4D97-AF65-F5344CB8AC3E}">
@@ -2968,6 +2863,72 @@
   <p:clrMapOvr>
     <a:masterClrMapping/>
   </p:clrMapOvr>
+  <p:timing>
+    <p:tnLst>
+      <p:par>
+        <p:cTn id="1" dur="indefinite" restart="never" nodeType="tmRoot">
+          <p:childTnLst>
+            <p:seq concurrent="1" nextAc="seek">
+              <p:cTn id="2" dur="indefinite" nodeType="mainSeq">
+                <p:childTnLst>
+                  <p:par>
+                    <p:cTn id="3" fill="hold">
+                      <p:stCondLst>
+                        <p:cond delay="indefinite"/>
+                      </p:stCondLst>
+                      <p:childTnLst>
+                        <p:par>
+                          <p:cTn id="4" fill="hold">
+                            <p:stCondLst>
+                              <p:cond delay="0"/>
+                            </p:stCondLst>
+                            <p:childTnLst>
+                              <p:par>
+                                <p:cTn id="5" presetID="6" presetClass="emph" presetSubtype="0" fill="hold" nodeType="clickEffect">
+                                  <p:stCondLst>
+                                    <p:cond delay="0"/>
+                                  </p:stCondLst>
+                                  <p:childTnLst>
+                                    <p:animScale>
+                                      <p:cBhvr>
+                                        <p:cTn id="6" dur="2000" fill="hold"/>
+                                        <p:tgtEl>
+                                          <p:spTgt spid="6"/>
+                                        </p:tgtEl>
+                                      </p:cBhvr>
+                                      <p:by x="50000" y="50000"/>
+                                    </p:animScale>
+                                  </p:childTnLst>
+                                </p:cTn>
+                              </p:par>
+                            </p:childTnLst>
+                          </p:cTn>
+                        </p:par>
+                      </p:childTnLst>
+                    </p:cTn>
+                  </p:par>
+                </p:childTnLst>
+              </p:cTn>
+              <p:prevCondLst>
+                <p:cond evt="onPrev" delay="0">
+                  <p:tgtEl>
+                    <p:sldTgt/>
+                  </p:tgtEl>
+                </p:cond>
+              </p:prevCondLst>
+              <p:nextCondLst>
+                <p:cond evt="onNext" delay="0">
+                  <p:tgtEl>
+                    <p:sldTgt/>
+                  </p:tgtEl>
+                </p:cond>
+              </p:nextCondLst>
+            </p:seq>
+          </p:childTnLst>
+        </p:cTn>
+      </p:par>
+    </p:tnLst>
+  </p:timing>
 </p:sld>
 </file>
 
@@ -3076,7 +3037,7 @@
         <p:spPr>
           <a:xfrm>
             <a:off x="258154" y="582182"/>
-            <a:ext cx="4119205" cy="400110"/>
+            <a:ext cx="4334905" cy="400110"/>
           </a:xfrm>
           <a:prstGeom prst="rect">
             <a:avLst/>
@@ -3093,7 +3054,7 @@
               <a:rPr lang="vi-VN" sz="2000" b="1" dirty="0">
                 <a:latin typeface="Malgun Gothic (Headings)"/>
               </a:rPr>
-              <a:t>a. User interface (Main window)</a:t>
+              <a:t>a. User interface (Report window)</a:t>
             </a:r>
             <a:endParaRPr lang="en-US" sz="2000" b="1" dirty="0">
               <a:latin typeface="Malgun Gothic (Headings)"/>
@@ -3103,10 +3064,10 @@
       </p:sp>
       <p:pic>
         <p:nvPicPr>
-          <p:cNvPr id="6" name="Picture 5">
+          <p:cNvPr id="5" name="Picture 4">
             <a:extLst>
               <a:ext uri="{FF2B5EF4-FFF2-40B4-BE49-F238E27FC236}">
-                <a16:creationId xmlns:a16="http://schemas.microsoft.com/office/drawing/2014/main" id="{0A00BFA3-C0CF-4253-B1F3-ECD0997146A6}"/>
+                <a16:creationId xmlns:a16="http://schemas.microsoft.com/office/drawing/2014/main" id="{4CEAED1E-BF0E-45F9-8D52-B3B9BDA2F28E}"/>
               </a:ext>
             </a:extLst>
           </p:cNvPr>
@@ -3123,8 +3084,8 @@
         </p:blipFill>
         <p:spPr>
           <a:xfrm>
-            <a:off x="228600" y="1356666"/>
-            <a:ext cx="9510812" cy="4805838"/>
+            <a:off x="762000" y="1405109"/>
+            <a:ext cx="8382000" cy="4712574"/>
           </a:xfrm>
           <a:prstGeom prst="rect">
             <a:avLst/>
@@ -3133,10 +3094,10 @@
       </p:pic>
       <p:sp>
         <p:nvSpPr>
-          <p:cNvPr id="11" name="TextBox 10">
+          <p:cNvPr id="8" name="TextBox 7">
             <a:extLst>
               <a:ext uri="{FF2B5EF4-FFF2-40B4-BE49-F238E27FC236}">
-                <a16:creationId xmlns:a16="http://schemas.microsoft.com/office/drawing/2014/main" id="{32D8E454-EF16-43E0-9939-5BAB795F5F41}"/>
+                <a16:creationId xmlns:a16="http://schemas.microsoft.com/office/drawing/2014/main" id="{366AEBA4-30C5-4E4E-8F20-47039543CF04}"/>
               </a:ext>
             </a:extLst>
           </p:cNvPr>
@@ -3145,8 +3106,8 @@
         </p:nvSpPr>
         <p:spPr>
           <a:xfrm>
-            <a:off x="4953000" y="3244334"/>
-            <a:ext cx="1895408" cy="369332"/>
+            <a:off x="6019800" y="1556266"/>
+            <a:ext cx="1981200" cy="369332"/>
           </a:xfrm>
           <a:prstGeom prst="rect">
             <a:avLst/>
@@ -3185,7 +3146,7 @@
                   </a:outerShdw>
                 </a:effectLst>
               </a:rPr>
-              <a:t>Connect setting</a:t>
+              <a:t>Report code filter</a:t>
             </a:r>
             <a:endParaRPr lang="en-US" dirty="0">
               <a:solidFill>
@@ -3204,10 +3165,10 @@
       </p:sp>
       <p:sp>
         <p:nvSpPr>
-          <p:cNvPr id="13" name="TextBox 12">
+          <p:cNvPr id="9" name="TextBox 8">
             <a:extLst>
               <a:ext uri="{FF2B5EF4-FFF2-40B4-BE49-F238E27FC236}">
-                <a16:creationId xmlns:a16="http://schemas.microsoft.com/office/drawing/2014/main" id="{C74319AC-DE2B-4B79-B96F-07905A4EC181}"/>
+                <a16:creationId xmlns:a16="http://schemas.microsoft.com/office/drawing/2014/main" id="{388CDF26-E209-46B1-BC7E-547F123F38E8}"/>
               </a:ext>
             </a:extLst>
           </p:cNvPr>
@@ -3216,8 +3177,8 @@
         </p:nvSpPr>
         <p:spPr>
           <a:xfrm>
-            <a:off x="6848408" y="2907268"/>
-            <a:ext cx="2524192" cy="369332"/>
+            <a:off x="1219200" y="1371600"/>
+            <a:ext cx="2083527" cy="369332"/>
           </a:xfrm>
           <a:prstGeom prst="rect">
             <a:avLst/>
@@ -3256,17 +3217,17 @@
                   </a:outerShdw>
                 </a:effectLst>
               </a:rPr>
-              <a:t>Elnec programmer log</a:t>
-            </a:r>
-          </a:p>
-        </p:txBody>
-      </p:sp>
-      <p:sp>
-        <p:nvSpPr>
-          <p:cNvPr id="15" name="TextBox 14">
+              <a:t>Report date filter</a:t>
+            </a:r>
+          </a:p>
+        </p:txBody>
+      </p:sp>
+      <p:sp>
+        <p:nvSpPr>
+          <p:cNvPr id="10" name="TextBox 9">
             <a:extLst>
               <a:ext uri="{FF2B5EF4-FFF2-40B4-BE49-F238E27FC236}">
-                <a16:creationId xmlns:a16="http://schemas.microsoft.com/office/drawing/2014/main" id="{43A3991F-5A7A-4369-B5C6-925C1069240A}"/>
+                <a16:creationId xmlns:a16="http://schemas.microsoft.com/office/drawing/2014/main" id="{AC975A9E-BA0A-4FDC-9B93-94A3CFA9C3D0}"/>
               </a:ext>
             </a:extLst>
           </p:cNvPr>
@@ -3275,8 +3236,8 @@
         </p:nvSpPr>
         <p:spPr>
           <a:xfrm>
-            <a:off x="2590800" y="3276600"/>
-            <a:ext cx="1550127" cy="369332"/>
+            <a:off x="7391400" y="6085417"/>
+            <a:ext cx="1752600" cy="369332"/>
           </a:xfrm>
           <a:prstGeom prst="rect">
             <a:avLst/>
@@ -3315,17 +3276,17 @@
                   </a:outerShdw>
                 </a:effectLst>
               </a:rPr>
-              <a:t>ROM setting</a:t>
-            </a:r>
-          </a:p>
-        </p:txBody>
-      </p:sp>
-      <p:sp>
-        <p:nvSpPr>
-          <p:cNvPr id="24" name="TextBox 23">
+              <a:t>Window action</a:t>
+            </a:r>
+          </a:p>
+        </p:txBody>
+      </p:sp>
+      <p:sp>
+        <p:nvSpPr>
+          <p:cNvPr id="17" name="TextBox 16">
             <a:extLst>
               <a:ext uri="{FF2B5EF4-FFF2-40B4-BE49-F238E27FC236}">
-                <a16:creationId xmlns:a16="http://schemas.microsoft.com/office/drawing/2014/main" id="{B7C81619-67A3-4928-A715-B2687F1BD658}"/>
+                <a16:creationId xmlns:a16="http://schemas.microsoft.com/office/drawing/2014/main" id="{20806452-A634-4CD8-9319-5D3B60B9516B}"/>
               </a:ext>
             </a:extLst>
           </p:cNvPr>
@@ -3334,8 +3295,8 @@
         </p:nvSpPr>
         <p:spPr>
           <a:xfrm>
-            <a:off x="3595687" y="2177534"/>
-            <a:ext cx="1905000" cy="369332"/>
+            <a:off x="1815736" y="6085417"/>
+            <a:ext cx="1918064" cy="369332"/>
           </a:xfrm>
           <a:prstGeom prst="rect">
             <a:avLst/>
@@ -3362,6 +3323,77 @@
           <a:lstStyle/>
           <a:p>
             <a:r>
+              <a:rPr lang="vi-VN" dirty="0">
+                <a:solidFill>
+                  <a:schemeClr val="bg1"/>
+                </a:solidFill>
+                <a:effectLst>
+                  <a:outerShdw blurRad="38100" dist="38100" dir="2700000" algn="tl">
+                    <a:srgbClr val="000000">
+                      <a:alpha val="43137"/>
+                    </a:srgbClr>
+                  </a:outerShdw>
+                </a:effectLst>
+              </a:rPr>
+              <a:t>Report Statistical</a:t>
+            </a:r>
+            <a:endParaRPr lang="en-US" dirty="0">
+              <a:solidFill>
+                <a:schemeClr val="bg1"/>
+              </a:solidFill>
+              <a:effectLst>
+                <a:outerShdw blurRad="38100" dist="38100" dir="2700000" algn="tl">
+                  <a:srgbClr val="000000">
+                    <a:alpha val="43137"/>
+                  </a:srgbClr>
+                </a:outerShdw>
+              </a:effectLst>
+            </a:endParaRPr>
+          </a:p>
+        </p:txBody>
+      </p:sp>
+      <p:sp>
+        <p:nvSpPr>
+          <p:cNvPr id="19" name="TextBox 18">
+            <a:extLst>
+              <a:ext uri="{FF2B5EF4-FFF2-40B4-BE49-F238E27FC236}">
+                <a16:creationId xmlns:a16="http://schemas.microsoft.com/office/drawing/2014/main" id="{1A57E491-B693-4150-9C20-A5ABCB236A84}"/>
+              </a:ext>
+            </a:extLst>
+          </p:cNvPr>
+          <p:cNvSpPr txBox="1"/>
+          <p:nvPr/>
+        </p:nvSpPr>
+        <p:spPr>
+          <a:xfrm>
+            <a:off x="3685904" y="3884083"/>
+            <a:ext cx="2083527" cy="369332"/>
+          </a:xfrm>
+          <a:prstGeom prst="rect">
+            <a:avLst/>
+          </a:prstGeom>
+        </p:spPr>
+        <p:style>
+          <a:lnRef idx="3">
+            <a:schemeClr val="lt1"/>
+          </a:lnRef>
+          <a:fillRef idx="1">
+            <a:schemeClr val="accent4"/>
+          </a:fillRef>
+          <a:effectRef idx="1">
+            <a:schemeClr val="accent4"/>
+          </a:effectRef>
+          <a:fontRef idx="minor">
+            <a:schemeClr val="lt1"/>
+          </a:fontRef>
+        </p:style>
+        <p:txBody>
+          <a:bodyPr wrap="square" rtlCol="0">
+            <a:spAutoFit/>
+          </a:bodyPr>
+          <a:lstStyle/>
+          <a:p>
+            <a:r>
               <a:rPr lang="en-US" dirty="0">
                 <a:solidFill>
                   <a:schemeClr val="bg1"/>
@@ -3374,7 +3406,7 @@
                   </a:outerShdw>
                 </a:effectLst>
               </a:rPr>
-              <a:t>JIG</a:t>
+              <a:t>Report </a:t>
             </a:r>
             <a:r>
               <a:rPr lang="vi-VN" dirty="0">
@@ -3389,7 +3421,7 @@
                   </a:outerShdw>
                 </a:effectLst>
               </a:rPr>
-              <a:t> layout setting</a:t>
+              <a:t>data</a:t>
             </a:r>
             <a:endParaRPr lang="en-US" dirty="0">
               <a:solidFill>
@@ -3409,7 +3441,7 @@
     </p:spTree>
     <p:extLst>
       <p:ext uri="{BB962C8B-B14F-4D97-AF65-F5344CB8AC3E}">
-        <p14:creationId xmlns:p14="http://schemas.microsoft.com/office/powerpoint/2010/main" val="4203229423"/>
+        <p14:creationId xmlns:p14="http://schemas.microsoft.com/office/powerpoint/2010/main" val="777190280"/>
       </p:ext>
     </p:extLst>
   </p:cSld>
@@ -3524,7 +3556,7 @@
         <p:spPr>
           <a:xfrm>
             <a:off x="258154" y="582182"/>
-            <a:ext cx="4334905" cy="400110"/>
+            <a:ext cx="3382529" cy="400110"/>
           </a:xfrm>
           <a:prstGeom prst="rect">
             <a:avLst/>
@@ -3541,50 +3573,17 @@
               <a:rPr lang="vi-VN" sz="2000" b="1" dirty="0">
                 <a:latin typeface="Malgun Gothic (Headings)"/>
               </a:rPr>
-              <a:t>a. User interface (Report window)</a:t>
-            </a:r>
-            <a:endParaRPr lang="en-US" sz="2000" b="1" dirty="0">
-              <a:latin typeface="Malgun Gothic (Headings)"/>
-            </a:endParaRPr>
-          </a:p>
-        </p:txBody>
-      </p:sp>
-      <p:pic>
-        <p:nvPicPr>
-          <p:cNvPr id="5" name="Picture 4">
+              <a:t>b. Software main function</a:t>
+            </a:r>
+          </a:p>
+        </p:txBody>
+      </p:sp>
+      <p:sp>
+        <p:nvSpPr>
+          <p:cNvPr id="3" name="TextBox 2">
             <a:extLst>
               <a:ext uri="{FF2B5EF4-FFF2-40B4-BE49-F238E27FC236}">
-                <a16:creationId xmlns:a16="http://schemas.microsoft.com/office/drawing/2014/main" id="{4CEAED1E-BF0E-45F9-8D52-B3B9BDA2F28E}"/>
-              </a:ext>
-            </a:extLst>
-          </p:cNvPr>
-          <p:cNvPicPr>
-            <a:picLocks noChangeAspect="1"/>
-          </p:cNvPicPr>
-          <p:nvPr/>
-        </p:nvPicPr>
-        <p:blipFill>
-          <a:blip r:embed="rId2"/>
-          <a:stretch>
-            <a:fillRect/>
-          </a:stretch>
-        </p:blipFill>
-        <p:spPr>
-          <a:xfrm>
-            <a:off x="762000" y="1405109"/>
-            <a:ext cx="8382000" cy="4712574"/>
-          </a:xfrm>
-          <a:prstGeom prst="rect">
-            <a:avLst/>
-          </a:prstGeom>
-        </p:spPr>
-      </p:pic>
-      <p:sp>
-        <p:nvSpPr>
-          <p:cNvPr id="8" name="TextBox 7">
-            <a:extLst>
-              <a:ext uri="{FF2B5EF4-FFF2-40B4-BE49-F238E27FC236}">
-                <a16:creationId xmlns:a16="http://schemas.microsoft.com/office/drawing/2014/main" id="{366AEBA4-30C5-4E4E-8F20-47039543CF04}"/>
+                <a16:creationId xmlns:a16="http://schemas.microsoft.com/office/drawing/2014/main" id="{B417CB69-0DB6-4D51-9C32-005017DC6C0A}"/>
               </a:ext>
             </a:extLst>
           </p:cNvPr>
@@ -3593,342 +3592,145 @@
         </p:nvSpPr>
         <p:spPr>
           <a:xfrm>
-            <a:off x="6019800" y="1556266"/>
-            <a:ext cx="1981200" cy="369332"/>
-          </a:xfrm>
-          <a:prstGeom prst="rect">
-            <a:avLst/>
-          </a:prstGeom>
-        </p:spPr>
-        <p:style>
-          <a:lnRef idx="3">
-            <a:schemeClr val="lt1"/>
-          </a:lnRef>
-          <a:fillRef idx="1">
-            <a:schemeClr val="accent4"/>
-          </a:fillRef>
-          <a:effectRef idx="1">
-            <a:schemeClr val="accent4"/>
-          </a:effectRef>
-          <a:fontRef idx="minor">
-            <a:schemeClr val="lt1"/>
-          </a:fontRef>
-        </p:style>
+            <a:off x="258154" y="2286000"/>
+            <a:ext cx="9236366" cy="2862322"/>
+          </a:xfrm>
+          <a:prstGeom prst="rect">
+            <a:avLst/>
+          </a:prstGeom>
+          <a:noFill/>
+        </p:spPr>
         <p:txBody>
           <a:bodyPr wrap="square" rtlCol="0">
             <a:spAutoFit/>
           </a:bodyPr>
           <a:lstStyle/>
           <a:p>
-            <a:r>
-              <a:rPr lang="vi-VN">
-                <a:solidFill>
-                  <a:schemeClr val="bg1"/>
-                </a:solidFill>
-                <a:effectLst>
-                  <a:outerShdw blurRad="38100" dist="38100" dir="2700000" algn="tl">
-                    <a:srgbClr val="000000">
-                      <a:alpha val="43137"/>
-                    </a:srgbClr>
-                  </a:outerShdw>
-                </a:effectLst>
-              </a:rPr>
-              <a:t>Report code filter</a:t>
-            </a:r>
-            <a:endParaRPr lang="en-US" dirty="0">
-              <a:solidFill>
-                <a:schemeClr val="bg1"/>
-              </a:solidFill>
-              <a:effectLst>
-                <a:outerShdw blurRad="38100" dist="38100" dir="2700000" algn="tl">
-                  <a:srgbClr val="000000">
-                    <a:alpha val="43137"/>
-                  </a:srgbClr>
-                </a:outerShdw>
-              </a:effectLst>
-            </a:endParaRPr>
-          </a:p>
-        </p:txBody>
-      </p:sp>
-      <p:sp>
-        <p:nvSpPr>
-          <p:cNvPr id="9" name="TextBox 8">
-            <a:extLst>
-              <a:ext uri="{FF2B5EF4-FFF2-40B4-BE49-F238E27FC236}">
-                <a16:creationId xmlns:a16="http://schemas.microsoft.com/office/drawing/2014/main" id="{388CDF26-E209-46B1-BC7E-547F123F38E8}"/>
-              </a:ext>
-            </a:extLst>
-          </p:cNvPr>
-          <p:cNvSpPr txBox="1"/>
-          <p:nvPr/>
-        </p:nvSpPr>
-        <p:spPr>
-          <a:xfrm>
-            <a:off x="1219200" y="1371600"/>
-            <a:ext cx="2083527" cy="369332"/>
-          </a:xfrm>
-          <a:prstGeom prst="rect">
-            <a:avLst/>
-          </a:prstGeom>
-        </p:spPr>
-        <p:style>
-          <a:lnRef idx="3">
-            <a:schemeClr val="lt1"/>
-          </a:lnRef>
-          <a:fillRef idx="1">
-            <a:schemeClr val="accent4"/>
-          </a:fillRef>
-          <a:effectRef idx="1">
-            <a:schemeClr val="accent4"/>
-          </a:effectRef>
-          <a:fontRef idx="minor">
-            <a:schemeClr val="lt1"/>
-          </a:fontRef>
-        </p:style>
-        <p:txBody>
-          <a:bodyPr wrap="square" rtlCol="0">
-            <a:spAutoFit/>
-          </a:bodyPr>
-          <a:lstStyle/>
-          <a:p>
-            <a:r>
-              <a:rPr lang="en-US" dirty="0">
-                <a:solidFill>
-                  <a:schemeClr val="bg1"/>
-                </a:solidFill>
-                <a:effectLst>
-                  <a:outerShdw blurRad="38100" dist="38100" dir="2700000" algn="tl">
-                    <a:srgbClr val="000000">
-                      <a:alpha val="43137"/>
-                    </a:srgbClr>
-                  </a:outerShdw>
-                </a:effectLst>
-              </a:rPr>
-              <a:t>Report date filter</a:t>
-            </a:r>
-          </a:p>
-        </p:txBody>
-      </p:sp>
-      <p:sp>
-        <p:nvSpPr>
-          <p:cNvPr id="10" name="TextBox 9">
-            <a:extLst>
-              <a:ext uri="{FF2B5EF4-FFF2-40B4-BE49-F238E27FC236}">
-                <a16:creationId xmlns:a16="http://schemas.microsoft.com/office/drawing/2014/main" id="{AC975A9E-BA0A-4FDC-9B93-94A3CFA9C3D0}"/>
-              </a:ext>
-            </a:extLst>
-          </p:cNvPr>
-          <p:cNvSpPr txBox="1"/>
-          <p:nvPr/>
-        </p:nvSpPr>
-        <p:spPr>
-          <a:xfrm>
-            <a:off x="7391400" y="6085417"/>
-            <a:ext cx="1752600" cy="369332"/>
-          </a:xfrm>
-          <a:prstGeom prst="rect">
-            <a:avLst/>
-          </a:prstGeom>
-        </p:spPr>
-        <p:style>
-          <a:lnRef idx="3">
-            <a:schemeClr val="lt1"/>
-          </a:lnRef>
-          <a:fillRef idx="1">
-            <a:schemeClr val="accent4"/>
-          </a:fillRef>
-          <a:effectRef idx="1">
-            <a:schemeClr val="accent4"/>
-          </a:effectRef>
-          <a:fontRef idx="minor">
-            <a:schemeClr val="lt1"/>
-          </a:fontRef>
-        </p:style>
-        <p:txBody>
-          <a:bodyPr wrap="square" rtlCol="0">
-            <a:spAutoFit/>
-          </a:bodyPr>
-          <a:lstStyle/>
-          <a:p>
-            <a:r>
-              <a:rPr lang="en-US" dirty="0">
-                <a:solidFill>
-                  <a:schemeClr val="bg1"/>
-                </a:solidFill>
-                <a:effectLst>
-                  <a:outerShdw blurRad="38100" dist="38100" dir="2700000" algn="tl">
-                    <a:srgbClr val="000000">
-                      <a:alpha val="43137"/>
-                    </a:srgbClr>
-                  </a:outerShdw>
-                </a:effectLst>
-              </a:rPr>
-              <a:t>Window action</a:t>
-            </a:r>
-          </a:p>
-        </p:txBody>
-      </p:sp>
-      <p:sp>
-        <p:nvSpPr>
-          <p:cNvPr id="17" name="TextBox 16">
-            <a:extLst>
-              <a:ext uri="{FF2B5EF4-FFF2-40B4-BE49-F238E27FC236}">
-                <a16:creationId xmlns:a16="http://schemas.microsoft.com/office/drawing/2014/main" id="{20806452-A634-4CD8-9319-5D3B60B9516B}"/>
-              </a:ext>
-            </a:extLst>
-          </p:cNvPr>
-          <p:cNvSpPr txBox="1"/>
-          <p:nvPr/>
-        </p:nvSpPr>
-        <p:spPr>
-          <a:xfrm>
-            <a:off x="1815736" y="6085417"/>
-            <a:ext cx="1918064" cy="369332"/>
-          </a:xfrm>
-          <a:prstGeom prst="rect">
-            <a:avLst/>
-          </a:prstGeom>
-        </p:spPr>
-        <p:style>
-          <a:lnRef idx="3">
-            <a:schemeClr val="lt1"/>
-          </a:lnRef>
-          <a:fillRef idx="1">
-            <a:schemeClr val="accent4"/>
-          </a:fillRef>
-          <a:effectRef idx="1">
-            <a:schemeClr val="accent4"/>
-          </a:effectRef>
-          <a:fontRef idx="minor">
-            <a:schemeClr val="lt1"/>
-          </a:fontRef>
-        </p:style>
-        <p:txBody>
-          <a:bodyPr wrap="square" rtlCol="0">
-            <a:spAutoFit/>
-          </a:bodyPr>
-          <a:lstStyle/>
-          <a:p>
-            <a:r>
-              <a:rPr lang="vi-VN" dirty="0">
-                <a:solidFill>
-                  <a:schemeClr val="bg1"/>
-                </a:solidFill>
-                <a:effectLst>
-                  <a:outerShdw blurRad="38100" dist="38100" dir="2700000" algn="tl">
-                    <a:srgbClr val="000000">
-                      <a:alpha val="43137"/>
-                    </a:srgbClr>
-                  </a:outerShdw>
-                </a:effectLst>
-              </a:rPr>
-              <a:t>Report Statistical</a:t>
-            </a:r>
-            <a:endParaRPr lang="en-US" dirty="0">
-              <a:solidFill>
-                <a:schemeClr val="bg1"/>
-              </a:solidFill>
-              <a:effectLst>
-                <a:outerShdw blurRad="38100" dist="38100" dir="2700000" algn="tl">
-                  <a:srgbClr val="000000">
-                    <a:alpha val="43137"/>
-                  </a:srgbClr>
-                </a:outerShdw>
-              </a:effectLst>
-            </a:endParaRPr>
-          </a:p>
-        </p:txBody>
-      </p:sp>
-      <p:sp>
-        <p:nvSpPr>
-          <p:cNvPr id="19" name="TextBox 18">
-            <a:extLst>
-              <a:ext uri="{FF2B5EF4-FFF2-40B4-BE49-F238E27FC236}">
-                <a16:creationId xmlns:a16="http://schemas.microsoft.com/office/drawing/2014/main" id="{1A57E491-B693-4150-9C20-A5ABCB236A84}"/>
-              </a:ext>
-            </a:extLst>
-          </p:cNvPr>
-          <p:cNvSpPr txBox="1"/>
-          <p:nvPr/>
-        </p:nvSpPr>
-        <p:spPr>
-          <a:xfrm>
-            <a:off x="3685904" y="3884083"/>
-            <a:ext cx="2083527" cy="369332"/>
-          </a:xfrm>
-          <a:prstGeom prst="rect">
-            <a:avLst/>
-          </a:prstGeom>
-        </p:spPr>
-        <p:style>
-          <a:lnRef idx="3">
-            <a:schemeClr val="lt1"/>
-          </a:lnRef>
-          <a:fillRef idx="1">
-            <a:schemeClr val="accent4"/>
-          </a:fillRef>
-          <a:effectRef idx="1">
-            <a:schemeClr val="accent4"/>
-          </a:effectRef>
-          <a:fontRef idx="minor">
-            <a:schemeClr val="lt1"/>
-          </a:fontRef>
-        </p:style>
-        <p:txBody>
-          <a:bodyPr wrap="square" rtlCol="0">
-            <a:spAutoFit/>
-          </a:bodyPr>
-          <a:lstStyle/>
-          <a:p>
-            <a:r>
-              <a:rPr lang="en-US" dirty="0">
-                <a:solidFill>
-                  <a:schemeClr val="bg1"/>
-                </a:solidFill>
-                <a:effectLst>
-                  <a:outerShdw blurRad="38100" dist="38100" dir="2700000" algn="tl">
-                    <a:srgbClr val="000000">
-                      <a:alpha val="43137"/>
-                    </a:srgbClr>
-                  </a:outerShdw>
-                </a:effectLst>
-              </a:rPr>
-              <a:t>Report </a:t>
-            </a:r>
-            <a:r>
-              <a:rPr lang="vi-VN" dirty="0">
-                <a:solidFill>
-                  <a:schemeClr val="bg1"/>
-                </a:solidFill>
-                <a:effectLst>
-                  <a:outerShdw blurRad="38100" dist="38100" dir="2700000" algn="tl">
-                    <a:srgbClr val="000000">
-                      <a:alpha val="43137"/>
-                    </a:srgbClr>
-                  </a:outerShdw>
-                </a:effectLst>
-              </a:rPr>
-              <a:t>data</a:t>
-            </a:r>
-            <a:endParaRPr lang="en-US" dirty="0">
-              <a:solidFill>
-                <a:schemeClr val="bg1"/>
-              </a:solidFill>
-              <a:effectLst>
-                <a:outerShdw blurRad="38100" dist="38100" dir="2700000" algn="tl">
-                  <a:srgbClr val="000000">
-                    <a:alpha val="43137"/>
-                  </a:srgbClr>
-                </a:outerShdw>
-              </a:effectLst>
-            </a:endParaRPr>
+            <a:pPr marL="342900" indent="-342900">
+              <a:buFont typeface="Arial" panose="020B0604020202020204" pitchFamily="34" charset="0"/>
+              <a:buChar char="•"/>
+            </a:pPr>
+            <a:r>
+              <a:rPr lang="en-US" dirty="0"/>
+              <a:t>Load the program at the same time for 4 MCU</a:t>
+            </a:r>
+          </a:p>
+          <a:p>
+            <a:pPr marL="342900" indent="-342900">
+              <a:buFont typeface="Arial" panose="020B0604020202020204" pitchFamily="34" charset="0"/>
+              <a:buChar char="•"/>
+            </a:pPr>
+            <a:r>
+              <a:rPr lang="en-US" dirty="0"/>
+              <a:t>Programs at different websites can be the same or different, up to 4 programs</a:t>
+            </a:r>
+            <a:endParaRPr lang="vi-VN" dirty="0"/>
+          </a:p>
+          <a:p>
+            <a:pPr marL="342900" indent="-342900">
+              <a:buFont typeface="Arial" panose="020B0604020202020204" pitchFamily="34" charset="0"/>
+              <a:buChar char="•"/>
+            </a:pPr>
+            <a:r>
+              <a:rPr lang="en-US" dirty="0"/>
+              <a:t>Create new programs on demand.</a:t>
+            </a:r>
+            <a:endParaRPr lang="vi-VN" dirty="0"/>
+          </a:p>
+          <a:p>
+            <a:pPr marL="342900" indent="-342900">
+              <a:buFont typeface="Arial" panose="020B0604020202020204" pitchFamily="34" charset="0"/>
+              <a:buChar char="•"/>
+            </a:pPr>
+            <a:r>
+              <a:rPr lang="en-US" dirty="0"/>
+              <a:t>Summarize the results, shown "ON", "FAIL" slot by slot</a:t>
+            </a:r>
+            <a:endParaRPr lang="vi-VN" dirty="0"/>
+          </a:p>
+          <a:p>
+            <a:pPr marL="342900" indent="-342900">
+              <a:buFont typeface="Arial" panose="020B0604020202020204" pitchFamily="34" charset="0"/>
+              <a:buChar char="•"/>
+            </a:pPr>
+            <a:r>
+              <a:rPr lang="en-US" dirty="0"/>
+              <a:t>Display logs from </a:t>
+            </a:r>
+            <a:r>
+              <a:rPr lang="vi-VN" dirty="0"/>
+              <a:t>Elnecs</a:t>
+            </a:r>
+            <a:r>
+              <a:rPr lang="en-US" dirty="0"/>
+              <a:t> programmer, use them for debugging situations when unexpected errors are encountered</a:t>
+            </a:r>
+            <a:endParaRPr lang="vi-VN" dirty="0"/>
+          </a:p>
+          <a:p>
+            <a:pPr marL="342900" indent="-342900">
+              <a:buFont typeface="Arial" panose="020B0604020202020204" pitchFamily="34" charset="0"/>
+              <a:buChar char="•"/>
+            </a:pPr>
+            <a:r>
+              <a:rPr lang="en-US" dirty="0"/>
+              <a:t>Export and manager report files, filter and export results </a:t>
+            </a:r>
+            <a:r>
+              <a:rPr lang="vi-VN" dirty="0"/>
+              <a:t>independently.</a:t>
+            </a:r>
+          </a:p>
+          <a:p>
+            <a:pPr marL="342900" indent="-342900">
+              <a:buFont typeface="Arial" panose="020B0604020202020204" pitchFamily="34" charset="0"/>
+              <a:buChar char="•"/>
+            </a:pPr>
+            <a:r>
+              <a:rPr lang="en-US" dirty="0"/>
+              <a:t>Statistics of the number of OK / </a:t>
+            </a:r>
+            <a:r>
+              <a:rPr lang="vi-VN" dirty="0"/>
+              <a:t>FAIL</a:t>
+            </a:r>
+            <a:r>
+              <a:rPr lang="en-US" dirty="0"/>
+              <a:t>, calculate the rate of </a:t>
+            </a:r>
+            <a:r>
+              <a:rPr lang="vi-VN" dirty="0"/>
+              <a:t>FAIL</a:t>
+            </a:r>
+            <a:r>
+              <a:rPr lang="en-US" dirty="0"/>
+              <a:t> in the </a:t>
+            </a:r>
+            <a:r>
+              <a:rPr lang="vi-VN" dirty="0"/>
+              <a:t>day.</a:t>
+            </a:r>
+          </a:p>
+          <a:p>
+            <a:pPr marL="342900" indent="-342900">
+              <a:buFont typeface="Arial" panose="020B0604020202020204" pitchFamily="34" charset="0"/>
+              <a:buChar char="•"/>
+            </a:pPr>
+            <a:endParaRPr lang="vi-VN" dirty="0"/>
+          </a:p>
+          <a:p>
+            <a:pPr marL="342900" indent="-342900">
+              <a:buFont typeface="Arial" panose="020B0604020202020204" pitchFamily="34" charset="0"/>
+              <a:buChar char="•"/>
+            </a:pPr>
+            <a:endParaRPr lang="en-US" dirty="0"/>
           </a:p>
         </p:txBody>
       </p:sp>
     </p:spTree>
     <p:extLst>
       <p:ext uri="{BB962C8B-B14F-4D97-AF65-F5344CB8AC3E}">
-        <p14:creationId xmlns:p14="http://schemas.microsoft.com/office/powerpoint/2010/main" val="777190280"/>
+        <p14:creationId xmlns:p14="http://schemas.microsoft.com/office/powerpoint/2010/main" val="1850811800"/>
       </p:ext>
     </p:extLst>
   </p:cSld>
@@ -4043,7 +3845,7 @@
         <p:spPr>
           <a:xfrm>
             <a:off x="258154" y="582182"/>
-            <a:ext cx="3382529" cy="400110"/>
+            <a:ext cx="2908489" cy="400110"/>
           </a:xfrm>
           <a:prstGeom prst="rect">
             <a:avLst/>
@@ -4060,17 +3862,514 @@
               <a:rPr lang="vi-VN" sz="2000" b="1" dirty="0">
                 <a:latin typeface="Malgun Gothic (Headings)"/>
               </a:rPr>
-              <a:t>b. Software main function</a:t>
-            </a:r>
-          </a:p>
-        </p:txBody>
-      </p:sp>
-      <p:sp>
-        <p:nvSpPr>
-          <p:cNvPr id="3" name="TextBox 2">
+              <a:t>c. Setting/creat model</a:t>
+            </a:r>
+          </a:p>
+        </p:txBody>
+      </p:sp>
+      <p:pic>
+        <p:nvPicPr>
+          <p:cNvPr id="6" name="Picture 5">
             <a:extLst>
               <a:ext uri="{FF2B5EF4-FFF2-40B4-BE49-F238E27FC236}">
-                <a16:creationId xmlns:a16="http://schemas.microsoft.com/office/drawing/2014/main" id="{B417CB69-0DB6-4D51-9C32-005017DC6C0A}"/>
+                <a16:creationId xmlns:a16="http://schemas.microsoft.com/office/drawing/2014/main" id="{F9D685F3-BBCF-4B15-900D-5474DED53D17}"/>
+              </a:ext>
+            </a:extLst>
+          </p:cNvPr>
+          <p:cNvPicPr>
+            <a:picLocks noChangeAspect="1"/>
+          </p:cNvPicPr>
+          <p:nvPr/>
+        </p:nvPicPr>
+        <p:blipFill>
+          <a:blip r:embed="rId2"/>
+          <a:stretch>
+            <a:fillRect/>
+          </a:stretch>
+        </p:blipFill>
+        <p:spPr>
+          <a:xfrm>
+            <a:off x="288634" y="2362200"/>
+            <a:ext cx="4907567" cy="2504904"/>
+          </a:xfrm>
+          <a:prstGeom prst="rect">
+            <a:avLst/>
+          </a:prstGeom>
+        </p:spPr>
+      </p:pic>
+      <p:sp>
+        <p:nvSpPr>
+          <p:cNvPr id="9" name="Callout: Line with Accent Bar 8">
+            <a:extLst>
+              <a:ext uri="{FF2B5EF4-FFF2-40B4-BE49-F238E27FC236}">
+                <a16:creationId xmlns:a16="http://schemas.microsoft.com/office/drawing/2014/main" id="{11043361-9A3E-4A5B-B7A8-8C852D83F5C6}"/>
+              </a:ext>
+            </a:extLst>
+          </p:cNvPr>
+          <p:cNvSpPr/>
+          <p:nvPr/>
+        </p:nvSpPr>
+        <p:spPr>
+          <a:xfrm>
+            <a:off x="3162289" y="1143000"/>
+            <a:ext cx="2908489" cy="511958"/>
+          </a:xfrm>
+          <a:prstGeom prst="accentCallout1">
+            <a:avLst>
+              <a:gd name="adj1" fmla="val 25607"/>
+              <a:gd name="adj2" fmla="val -2345"/>
+              <a:gd name="adj3" fmla="val 355765"/>
+              <a:gd name="adj4" fmla="val -43668"/>
+            </a:avLst>
+          </a:prstGeom>
+          <a:solidFill>
+            <a:schemeClr val="bg1"/>
+          </a:solidFill>
+          <a:ln>
+            <a:solidFill>
+              <a:srgbClr val="FF0000"/>
+            </a:solidFill>
+          </a:ln>
+        </p:spPr>
+        <p:style>
+          <a:lnRef idx="3">
+            <a:schemeClr val="lt1"/>
+          </a:lnRef>
+          <a:fillRef idx="1">
+            <a:schemeClr val="accent5"/>
+          </a:fillRef>
+          <a:effectRef idx="1">
+            <a:schemeClr val="accent5"/>
+          </a:effectRef>
+          <a:fontRef idx="minor">
+            <a:schemeClr val="lt1"/>
+          </a:fontRef>
+        </p:style>
+        <p:txBody>
+          <a:bodyPr rtlCol="0" anchor="ctr"/>
+          <a:lstStyle/>
+          <a:p>
+            <a:pPr algn="ctr"/>
+            <a:r>
+              <a:rPr lang="en-US" dirty="0">
+                <a:solidFill>
+                  <a:schemeClr val="tx1"/>
+                </a:solidFill>
+              </a:rPr>
+              <a:t>Preview JIG layout</a:t>
+            </a:r>
+          </a:p>
+        </p:txBody>
+      </p:sp>
+      <p:sp>
+        <p:nvSpPr>
+          <p:cNvPr id="11" name="Callout: Line with Accent Bar 10">
+            <a:extLst>
+              <a:ext uri="{FF2B5EF4-FFF2-40B4-BE49-F238E27FC236}">
+                <a16:creationId xmlns:a16="http://schemas.microsoft.com/office/drawing/2014/main" id="{763A2C65-829D-484D-B6D7-BDCD033F6BF3}"/>
+              </a:ext>
+            </a:extLst>
+          </p:cNvPr>
+          <p:cNvSpPr/>
+          <p:nvPr/>
+        </p:nvSpPr>
+        <p:spPr>
+          <a:xfrm>
+            <a:off x="6070777" y="1981200"/>
+            <a:ext cx="2908489" cy="511958"/>
+          </a:xfrm>
+          <a:prstGeom prst="accentCallout1">
+            <a:avLst>
+              <a:gd name="adj1" fmla="val 25607"/>
+              <a:gd name="adj2" fmla="val -2345"/>
+              <a:gd name="adj3" fmla="val 195868"/>
+              <a:gd name="adj4" fmla="val -58639"/>
+            </a:avLst>
+          </a:prstGeom>
+          <a:solidFill>
+            <a:schemeClr val="bg1"/>
+          </a:solidFill>
+          <a:ln>
+            <a:solidFill>
+              <a:srgbClr val="FF0000"/>
+            </a:solidFill>
+          </a:ln>
+        </p:spPr>
+        <p:style>
+          <a:lnRef idx="3">
+            <a:schemeClr val="lt1"/>
+          </a:lnRef>
+          <a:fillRef idx="1">
+            <a:schemeClr val="accent5"/>
+          </a:fillRef>
+          <a:effectRef idx="1">
+            <a:schemeClr val="accent5"/>
+          </a:effectRef>
+          <a:fontRef idx="minor">
+            <a:schemeClr val="lt1"/>
+          </a:fontRef>
+        </p:style>
+        <p:txBody>
+          <a:bodyPr rtlCol="0" anchor="ctr"/>
+          <a:lstStyle/>
+          <a:p>
+            <a:pPr algn="ctr"/>
+            <a:r>
+              <a:rPr lang="en-US" dirty="0">
+                <a:solidFill>
+                  <a:schemeClr val="tx1"/>
+                </a:solidFill>
+              </a:rPr>
+              <a:t>JIG layout</a:t>
+            </a:r>
+            <a:r>
+              <a:rPr lang="vi-VN" dirty="0">
+                <a:solidFill>
+                  <a:schemeClr val="tx1"/>
+                </a:solidFill>
+              </a:rPr>
+              <a:t> setting</a:t>
+            </a:r>
+            <a:endParaRPr lang="en-US" dirty="0">
+              <a:solidFill>
+                <a:schemeClr val="tx1"/>
+              </a:solidFill>
+            </a:endParaRPr>
+          </a:p>
+        </p:txBody>
+      </p:sp>
+      <p:sp>
+        <p:nvSpPr>
+          <p:cNvPr id="13" name="Callout: Line with Accent Bar 12">
+            <a:extLst>
+              <a:ext uri="{FF2B5EF4-FFF2-40B4-BE49-F238E27FC236}">
+                <a16:creationId xmlns:a16="http://schemas.microsoft.com/office/drawing/2014/main" id="{1BE27CD4-18C5-4EF1-802D-46F9E74EE5B0}"/>
+              </a:ext>
+            </a:extLst>
+          </p:cNvPr>
+          <p:cNvSpPr/>
+          <p:nvPr/>
+        </p:nvSpPr>
+        <p:spPr>
+          <a:xfrm>
+            <a:off x="6070778" y="3102694"/>
+            <a:ext cx="2908489" cy="511958"/>
+          </a:xfrm>
+          <a:prstGeom prst="accentCallout1">
+            <a:avLst>
+              <a:gd name="adj1" fmla="val 25607"/>
+              <a:gd name="adj2" fmla="val -2345"/>
+              <a:gd name="adj3" fmla="val 192466"/>
+              <a:gd name="adj4" fmla="val -60735"/>
+            </a:avLst>
+          </a:prstGeom>
+          <a:solidFill>
+            <a:schemeClr val="bg1"/>
+          </a:solidFill>
+          <a:ln>
+            <a:solidFill>
+              <a:srgbClr val="FF0000"/>
+            </a:solidFill>
+          </a:ln>
+        </p:spPr>
+        <p:style>
+          <a:lnRef idx="3">
+            <a:schemeClr val="lt1"/>
+          </a:lnRef>
+          <a:fillRef idx="1">
+            <a:schemeClr val="accent5"/>
+          </a:fillRef>
+          <a:effectRef idx="1">
+            <a:schemeClr val="accent5"/>
+          </a:effectRef>
+          <a:fontRef idx="minor">
+            <a:schemeClr val="lt1"/>
+          </a:fontRef>
+        </p:style>
+        <p:txBody>
+          <a:bodyPr rtlCol="0" anchor="ctr"/>
+          <a:lstStyle/>
+          <a:p>
+            <a:pPr algn="ctr"/>
+            <a:r>
+              <a:rPr lang="vi-VN" dirty="0">
+                <a:solidFill>
+                  <a:schemeClr val="tx1"/>
+                </a:solidFill>
+              </a:rPr>
+              <a:t>Connections setting</a:t>
+            </a:r>
+            <a:endParaRPr lang="en-US" dirty="0">
+              <a:solidFill>
+                <a:schemeClr val="tx1"/>
+              </a:solidFill>
+            </a:endParaRPr>
+          </a:p>
+        </p:txBody>
+      </p:sp>
+      <p:sp>
+        <p:nvSpPr>
+          <p:cNvPr id="15" name="Callout: Line with Accent Bar 14">
+            <a:extLst>
+              <a:ext uri="{FF2B5EF4-FFF2-40B4-BE49-F238E27FC236}">
+                <a16:creationId xmlns:a16="http://schemas.microsoft.com/office/drawing/2014/main" id="{B337639F-7537-4A6E-BA4D-50F5FF48FF55}"/>
+              </a:ext>
+            </a:extLst>
+          </p:cNvPr>
+          <p:cNvSpPr/>
+          <p:nvPr/>
+        </p:nvSpPr>
+        <p:spPr>
+          <a:xfrm>
+            <a:off x="5486400" y="5105400"/>
+            <a:ext cx="2908489" cy="511958"/>
+          </a:xfrm>
+          <a:prstGeom prst="accentCallout1">
+            <a:avLst>
+              <a:gd name="adj1" fmla="val 25607"/>
+              <a:gd name="adj2" fmla="val -2345"/>
+              <a:gd name="adj3" fmla="val -67792"/>
+              <a:gd name="adj4" fmla="val -110139"/>
+            </a:avLst>
+          </a:prstGeom>
+          <a:solidFill>
+            <a:schemeClr val="bg1"/>
+          </a:solidFill>
+          <a:ln>
+            <a:solidFill>
+              <a:srgbClr val="FF0000"/>
+            </a:solidFill>
+          </a:ln>
+        </p:spPr>
+        <p:style>
+          <a:lnRef idx="3">
+            <a:schemeClr val="lt1"/>
+          </a:lnRef>
+          <a:fillRef idx="1">
+            <a:schemeClr val="accent5"/>
+          </a:fillRef>
+          <a:effectRef idx="1">
+            <a:schemeClr val="accent5"/>
+          </a:effectRef>
+          <a:fontRef idx="minor">
+            <a:schemeClr val="lt1"/>
+          </a:fontRef>
+        </p:style>
+        <p:txBody>
+          <a:bodyPr rtlCol="0" anchor="ctr"/>
+          <a:lstStyle/>
+          <a:p>
+            <a:pPr algn="ctr"/>
+            <a:r>
+              <a:rPr lang="vi-VN" dirty="0">
+                <a:solidFill>
+                  <a:schemeClr val="tx1"/>
+                </a:solidFill>
+              </a:rPr>
+              <a:t>Model name form</a:t>
+            </a:r>
+            <a:endParaRPr lang="en-US" dirty="0">
+              <a:solidFill>
+                <a:schemeClr val="tx1"/>
+              </a:solidFill>
+            </a:endParaRPr>
+          </a:p>
+        </p:txBody>
+      </p:sp>
+      <p:sp>
+        <p:nvSpPr>
+          <p:cNvPr id="17" name="Callout: Line with Accent Bar 16">
+            <a:extLst>
+              <a:ext uri="{FF2B5EF4-FFF2-40B4-BE49-F238E27FC236}">
+                <a16:creationId xmlns:a16="http://schemas.microsoft.com/office/drawing/2014/main" id="{F9DA5149-89F3-48D7-B89B-978791E20D5C}"/>
+              </a:ext>
+            </a:extLst>
+          </p:cNvPr>
+          <p:cNvSpPr/>
+          <p:nvPr/>
+        </p:nvSpPr>
+        <p:spPr>
+          <a:xfrm>
+            <a:off x="2062919" y="5617358"/>
+            <a:ext cx="1823282" cy="629654"/>
+          </a:xfrm>
+          <a:prstGeom prst="accentCallout1">
+            <a:avLst>
+              <a:gd name="adj1" fmla="val 25607"/>
+              <a:gd name="adj2" fmla="val -2345"/>
+              <a:gd name="adj3" fmla="val -273617"/>
+              <a:gd name="adj4" fmla="val -42470"/>
+            </a:avLst>
+          </a:prstGeom>
+          <a:solidFill>
+            <a:schemeClr val="bg1"/>
+          </a:solidFill>
+          <a:ln>
+            <a:solidFill>
+              <a:srgbClr val="FF0000"/>
+            </a:solidFill>
+          </a:ln>
+        </p:spPr>
+        <p:style>
+          <a:lnRef idx="3">
+            <a:schemeClr val="lt1"/>
+          </a:lnRef>
+          <a:fillRef idx="1">
+            <a:schemeClr val="accent5"/>
+          </a:fillRef>
+          <a:effectRef idx="1">
+            <a:schemeClr val="accent5"/>
+          </a:effectRef>
+          <a:fontRef idx="minor">
+            <a:schemeClr val="lt1"/>
+          </a:fontRef>
+        </p:style>
+        <p:txBody>
+          <a:bodyPr rtlCol="0" anchor="ctr"/>
+          <a:lstStyle/>
+          <a:p>
+            <a:pPr algn="ctr"/>
+            <a:r>
+              <a:rPr lang="vi-VN" dirty="0">
+                <a:solidFill>
+                  <a:schemeClr val="tx1"/>
+                </a:solidFill>
+              </a:rPr>
+              <a:t>ROM </a:t>
+            </a:r>
+            <a:r>
+              <a:rPr lang="vi-VN">
+                <a:solidFill>
+                  <a:schemeClr val="tx1"/>
+                </a:solidFill>
+              </a:rPr>
+              <a:t>links and ROM </a:t>
+            </a:r>
+            <a:r>
+              <a:rPr lang="vi-VN" dirty="0">
+                <a:solidFill>
+                  <a:schemeClr val="tx1"/>
+                </a:solidFill>
+              </a:rPr>
+              <a:t>checksum</a:t>
+            </a:r>
+            <a:endParaRPr lang="en-US" dirty="0">
+              <a:solidFill>
+                <a:schemeClr val="tx1"/>
+              </a:solidFill>
+            </a:endParaRPr>
+          </a:p>
+        </p:txBody>
+      </p:sp>
+    </p:spTree>
+    <p:extLst>
+      <p:ext uri="{BB962C8B-B14F-4D97-AF65-F5344CB8AC3E}">
+        <p14:creationId xmlns:p14="http://schemas.microsoft.com/office/powerpoint/2010/main" val="3461269274"/>
+      </p:ext>
+    </p:extLst>
+  </p:cSld>
+  <p:clrMapOvr>
+    <a:masterClrMapping/>
+  </p:clrMapOvr>
+</p:sld>
+</file>
+
+<file path=ppt/slides/slide8.xml><?xml version="1.0" encoding="utf-8"?>
+<p:sld xmlns:a="http://schemas.openxmlformats.org/drawingml/2006/main" xmlns:r="http://schemas.openxmlformats.org/officeDocument/2006/relationships" xmlns:p="http://schemas.openxmlformats.org/presentationml/2006/main">
+  <p:cSld>
+    <p:spTree>
+      <p:nvGrpSpPr>
+        <p:cNvPr id="1" name=""/>
+        <p:cNvGrpSpPr/>
+        <p:nvPr/>
+      </p:nvGrpSpPr>
+      <p:grpSpPr>
+        <a:xfrm>
+          <a:off x="0" y="0"/>
+          <a:ext cx="0" cy="0"/>
+          <a:chOff x="0" y="0"/>
+          <a:chExt cx="0" cy="0"/>
+        </a:xfrm>
+      </p:grpSpPr>
+      <p:sp>
+        <p:nvSpPr>
+          <p:cNvPr id="2" name="Slide Number Placeholder 1"/>
+          <p:cNvSpPr>
+            <a:spLocks noGrp="1"/>
+          </p:cNvSpPr>
+          <p:nvPr>
+            <p:ph type="sldNum" sz="quarter" idx="4"/>
+          </p:nvPr>
+        </p:nvSpPr>
+        <p:spPr/>
+        <p:txBody>
+          <a:bodyPr/>
+          <a:lstStyle/>
+          <a:p>
+            <a:r>
+              <a:rPr lang="en-US" altLang="ko-KR"/>
+              <a:t>- </a:t>
+            </a:r>
+            <a:fld id="{7E2C4B30-5DF7-4A82-974D-B66255C87543}" type="slidenum">
+              <a:rPr lang="ko-KR" altLang="en-US" smtClean="0"/>
+              <a:pPr/>
+              <a:t>7</a:t>
+            </a:fld>
+            <a:r>
+              <a:rPr lang="ko-KR" altLang="en-US"/>
+              <a:t> </a:t>
+            </a:r>
+            <a:r>
+              <a:rPr lang="en-US" altLang="ko-KR"/>
+              <a:t>-</a:t>
+            </a:r>
+            <a:endParaRPr lang="ko-KR" altLang="en-US"/>
+          </a:p>
+        </p:txBody>
+      </p:sp>
+      <p:sp>
+        <p:nvSpPr>
+          <p:cNvPr id="4" name="TextBox 3"/>
+          <p:cNvSpPr txBox="1"/>
+          <p:nvPr/>
+        </p:nvSpPr>
+        <p:spPr>
+          <a:xfrm>
+            <a:off x="288634" y="164068"/>
+            <a:ext cx="1524648" cy="400110"/>
+          </a:xfrm>
+          <a:prstGeom prst="rect">
+            <a:avLst/>
+          </a:prstGeom>
+          <a:noFill/>
+        </p:spPr>
+        <p:txBody>
+          <a:bodyPr wrap="none" rtlCol="0">
+            <a:spAutoFit/>
+          </a:bodyPr>
+          <a:lstStyle/>
+          <a:p>
+            <a:r>
+              <a:rPr lang="vi-VN" sz="2000" b="1" dirty="0">
+                <a:latin typeface="+mj-lt"/>
+              </a:rPr>
+              <a:t>2. </a:t>
+            </a:r>
+            <a:r>
+              <a:rPr lang="en-US" sz="2000" b="1" dirty="0">
+                <a:latin typeface="+mj-lt"/>
+              </a:rPr>
+              <a:t>Software</a:t>
+            </a:r>
+          </a:p>
+        </p:txBody>
+      </p:sp>
+      <p:sp>
+        <p:nvSpPr>
+          <p:cNvPr id="7" name="TextBox 6">
+            <a:extLst>
+              <a:ext uri="{FF2B5EF4-FFF2-40B4-BE49-F238E27FC236}">
+                <a16:creationId xmlns:a16="http://schemas.microsoft.com/office/drawing/2014/main" id="{41FA46E4-B953-425F-8385-B130E4521872}"/>
               </a:ext>
             </a:extLst>
           </p:cNvPr>
@@ -4079,8 +4378,161 @@
         </p:nvSpPr>
         <p:spPr>
           <a:xfrm>
-            <a:off x="288634" y="1121992"/>
-            <a:ext cx="9236366" cy="1477328"/>
+            <a:off x="258154" y="582182"/>
+            <a:ext cx="2458622" cy="400110"/>
+          </a:xfrm>
+          <a:prstGeom prst="rect">
+            <a:avLst/>
+          </a:prstGeom>
+          <a:noFill/>
+        </p:spPr>
+        <p:txBody>
+          <a:bodyPr wrap="none" rtlCol="0">
+            <a:spAutoFit/>
+          </a:bodyPr>
+          <a:lstStyle/>
+          <a:p>
+            <a:r>
+              <a:rPr lang="vi-VN" sz="2000" b="1" dirty="0">
+                <a:latin typeface="Malgun Gothic (Headings)"/>
+              </a:rPr>
+              <a:t>c. Report manager</a:t>
+            </a:r>
+          </a:p>
+        </p:txBody>
+      </p:sp>
+      <p:pic>
+        <p:nvPicPr>
+          <p:cNvPr id="5" name="Picture 4">
+            <a:extLst>
+              <a:ext uri="{FF2B5EF4-FFF2-40B4-BE49-F238E27FC236}">
+                <a16:creationId xmlns:a16="http://schemas.microsoft.com/office/drawing/2014/main" id="{66053193-837D-43AB-BDEF-AD36A22C8A0E}"/>
+              </a:ext>
+            </a:extLst>
+          </p:cNvPr>
+          <p:cNvPicPr>
+            <a:picLocks noChangeAspect="1"/>
+          </p:cNvPicPr>
+          <p:nvPr/>
+        </p:nvPicPr>
+        <p:blipFill rotWithShape="1">
+          <a:blip r:embed="rId2"/>
+          <a:srcRect l="49489" t="5067" r="647" b="87437"/>
+          <a:stretch/>
+        </p:blipFill>
+        <p:spPr>
+          <a:xfrm>
+            <a:off x="3352799" y="2067670"/>
+            <a:ext cx="6310761" cy="533400"/>
+          </a:xfrm>
+          <a:prstGeom prst="rect">
+            <a:avLst/>
+          </a:prstGeom>
+        </p:spPr>
+      </p:pic>
+      <p:pic>
+        <p:nvPicPr>
+          <p:cNvPr id="8" name="Picture 7">
+            <a:extLst>
+              <a:ext uri="{FF2B5EF4-FFF2-40B4-BE49-F238E27FC236}">
+                <a16:creationId xmlns:a16="http://schemas.microsoft.com/office/drawing/2014/main" id="{3505EB63-F3F7-4E43-A925-1E42927567DF}"/>
+              </a:ext>
+            </a:extLst>
+          </p:cNvPr>
+          <p:cNvPicPr>
+            <a:picLocks noChangeAspect="1"/>
+          </p:cNvPicPr>
+          <p:nvPr/>
+        </p:nvPicPr>
+        <p:blipFill rotWithShape="1">
+          <a:blip r:embed="rId2"/>
+          <a:srcRect l="170" t="4834" r="49966" b="87670"/>
+          <a:stretch/>
+        </p:blipFill>
+        <p:spPr>
+          <a:xfrm>
+            <a:off x="3352800" y="1304653"/>
+            <a:ext cx="6310761" cy="533400"/>
+          </a:xfrm>
+          <a:prstGeom prst="rect">
+            <a:avLst/>
+          </a:prstGeom>
+        </p:spPr>
+      </p:pic>
+      <p:pic>
+        <p:nvPicPr>
+          <p:cNvPr id="10" name="Picture 9">
+            <a:extLst>
+              <a:ext uri="{FF2B5EF4-FFF2-40B4-BE49-F238E27FC236}">
+                <a16:creationId xmlns:a16="http://schemas.microsoft.com/office/drawing/2014/main" id="{051D494D-1667-4FA6-97F5-8FFD92B924D0}"/>
+              </a:ext>
+            </a:extLst>
+          </p:cNvPr>
+          <p:cNvPicPr>
+            <a:picLocks noChangeAspect="1"/>
+          </p:cNvPicPr>
+          <p:nvPr/>
+        </p:nvPicPr>
+        <p:blipFill rotWithShape="1">
+          <a:blip r:embed="rId2"/>
+          <a:srcRect t="14738" r="1258" b="43499"/>
+          <a:stretch/>
+        </p:blipFill>
+        <p:spPr>
+          <a:xfrm>
+            <a:off x="523038" y="3568700"/>
+            <a:ext cx="9107865" cy="2165895"/>
+          </a:xfrm>
+          <a:prstGeom prst="rect">
+            <a:avLst/>
+          </a:prstGeom>
+        </p:spPr>
+      </p:pic>
+      <p:pic>
+        <p:nvPicPr>
+          <p:cNvPr id="19" name="Picture 18">
+            <a:extLst>
+              <a:ext uri="{FF2B5EF4-FFF2-40B4-BE49-F238E27FC236}">
+                <a16:creationId xmlns:a16="http://schemas.microsoft.com/office/drawing/2014/main" id="{2D50C545-85E0-4B2E-9839-7775997A1569}"/>
+              </a:ext>
+            </a:extLst>
+          </p:cNvPr>
+          <p:cNvPicPr>
+            <a:picLocks noChangeAspect="1"/>
+          </p:cNvPicPr>
+          <p:nvPr/>
+        </p:nvPicPr>
+        <p:blipFill rotWithShape="1">
+          <a:blip r:embed="rId2"/>
+          <a:srcRect l="50000" t="92499" r="136" b="5"/>
+          <a:stretch/>
+        </p:blipFill>
+        <p:spPr>
+          <a:xfrm>
+            <a:off x="3320142" y="2873575"/>
+            <a:ext cx="6310761" cy="533400"/>
+          </a:xfrm>
+          <a:prstGeom prst="rect">
+            <a:avLst/>
+          </a:prstGeom>
+        </p:spPr>
+      </p:pic>
+      <p:sp>
+        <p:nvSpPr>
+          <p:cNvPr id="20" name="TextBox 19">
+            <a:extLst>
+              <a:ext uri="{FF2B5EF4-FFF2-40B4-BE49-F238E27FC236}">
+                <a16:creationId xmlns:a16="http://schemas.microsoft.com/office/drawing/2014/main" id="{076C10CA-B19E-4A74-AE97-3CB940999F8A}"/>
+              </a:ext>
+            </a:extLst>
+          </p:cNvPr>
+          <p:cNvSpPr txBox="1"/>
+          <p:nvPr/>
+        </p:nvSpPr>
+        <p:spPr>
+          <a:xfrm>
+            <a:off x="457200" y="1304653"/>
+            <a:ext cx="2590800" cy="369332"/>
           </a:xfrm>
           <a:prstGeom prst="rect">
             <a:avLst/>
@@ -4093,57 +4545,366 @@
           </a:bodyPr>
           <a:lstStyle/>
           <a:p>
-            <a:pPr marL="342900" indent="-342900">
-              <a:buFont typeface="Arial" panose="020B0604020202020204" pitchFamily="34" charset="0"/>
-              <a:buChar char="•"/>
-            </a:pPr>
+            <a:r>
+              <a:rPr lang="vi-VN" dirty="0"/>
+              <a:t>Fil data by date</a:t>
+            </a:r>
+            <a:endParaRPr lang="en-US" dirty="0"/>
+          </a:p>
+        </p:txBody>
+      </p:sp>
+      <p:sp>
+        <p:nvSpPr>
+          <p:cNvPr id="22" name="TextBox 21">
+            <a:extLst>
+              <a:ext uri="{FF2B5EF4-FFF2-40B4-BE49-F238E27FC236}">
+                <a16:creationId xmlns:a16="http://schemas.microsoft.com/office/drawing/2014/main" id="{1C0B6ED3-8871-4B58-80C1-5AC06140018B}"/>
+              </a:ext>
+            </a:extLst>
+          </p:cNvPr>
+          <p:cNvSpPr txBox="1"/>
+          <p:nvPr/>
+        </p:nvSpPr>
+        <p:spPr>
+          <a:xfrm>
+            <a:off x="446314" y="2149704"/>
+            <a:ext cx="2590800" cy="369332"/>
+          </a:xfrm>
+          <a:prstGeom prst="rect">
+            <a:avLst/>
+          </a:prstGeom>
+          <a:noFill/>
+        </p:spPr>
+        <p:txBody>
+          <a:bodyPr wrap="square" rtlCol="0">
+            <a:spAutoFit/>
+          </a:bodyPr>
+          <a:lstStyle/>
+          <a:p>
+            <a:r>
+              <a:rPr lang="vi-VN" dirty="0"/>
+              <a:t>Fil data by code</a:t>
+            </a:r>
+            <a:endParaRPr lang="en-US" dirty="0"/>
+          </a:p>
+        </p:txBody>
+      </p:sp>
+      <p:sp>
+        <p:nvSpPr>
+          <p:cNvPr id="24" name="TextBox 23">
+            <a:extLst>
+              <a:ext uri="{FF2B5EF4-FFF2-40B4-BE49-F238E27FC236}">
+                <a16:creationId xmlns:a16="http://schemas.microsoft.com/office/drawing/2014/main" id="{4C0BE0CE-F1FA-4653-8D55-53E641A328FC}"/>
+              </a:ext>
+            </a:extLst>
+          </p:cNvPr>
+          <p:cNvSpPr txBox="1"/>
+          <p:nvPr/>
+        </p:nvSpPr>
+        <p:spPr>
+          <a:xfrm>
+            <a:off x="457200" y="2955609"/>
+            <a:ext cx="2590800" cy="369332"/>
+          </a:xfrm>
+          <a:prstGeom prst="rect">
+            <a:avLst/>
+          </a:prstGeom>
+          <a:noFill/>
+        </p:spPr>
+        <p:txBody>
+          <a:bodyPr wrap="square" rtlCol="0">
+            <a:spAutoFit/>
+          </a:bodyPr>
+          <a:lstStyle/>
+          <a:p>
+            <a:r>
+              <a:rPr lang="vi-VN" dirty="0"/>
+              <a:t>Export data to txt file</a:t>
+            </a:r>
+            <a:endParaRPr lang="en-US" dirty="0"/>
+          </a:p>
+        </p:txBody>
+      </p:sp>
+      <p:sp>
+        <p:nvSpPr>
+          <p:cNvPr id="26" name="TextBox 25">
+            <a:extLst>
+              <a:ext uri="{FF2B5EF4-FFF2-40B4-BE49-F238E27FC236}">
+                <a16:creationId xmlns:a16="http://schemas.microsoft.com/office/drawing/2014/main" id="{3E2FB028-C073-4E54-9D38-D837CD46F109}"/>
+              </a:ext>
+            </a:extLst>
+          </p:cNvPr>
+          <p:cNvSpPr txBox="1"/>
+          <p:nvPr/>
+        </p:nvSpPr>
+        <p:spPr>
+          <a:xfrm>
+            <a:off x="457200" y="5768215"/>
+            <a:ext cx="8153400" cy="369332"/>
+          </a:xfrm>
+          <a:prstGeom prst="rect">
+            <a:avLst/>
+          </a:prstGeom>
+          <a:noFill/>
+        </p:spPr>
+        <p:txBody>
+          <a:bodyPr wrap="square" rtlCol="0">
+            <a:spAutoFit/>
+          </a:bodyPr>
+          <a:lstStyle/>
+          <a:p>
             <a:r>
               <a:rPr lang="en-US" dirty="0"/>
-              <a:t>Load the program at the same time for 4 MCU</a:t>
-            </a:r>
-          </a:p>
-          <a:p>
-            <a:pPr marL="342900" indent="-342900">
-              <a:buFont typeface="Arial" panose="020B0604020202020204" pitchFamily="34" charset="0"/>
-              <a:buChar char="•"/>
-            </a:pPr>
-            <a:r>
-              <a:rPr lang="en-US" dirty="0"/>
-              <a:t>Programs at different websites can be the same or different, up to 4 programs</a:t>
-            </a:r>
-            <a:endParaRPr lang="vi-VN" dirty="0"/>
-          </a:p>
-          <a:p>
-            <a:pPr marL="342900" indent="-342900">
-              <a:buFont typeface="Arial" panose="020B0604020202020204" pitchFamily="34" charset="0"/>
-              <a:buChar char="•"/>
-            </a:pPr>
-            <a:r>
-              <a:rPr lang="en-US" dirty="0"/>
-              <a:t>Summarize the results, shown "ON", "FAIL" slot by slot</a:t>
-            </a:r>
-            <a:endParaRPr lang="vi-VN" dirty="0"/>
-          </a:p>
-          <a:p>
-            <a:pPr marL="342900" indent="-342900">
-              <a:buFont typeface="Arial" panose="020B0604020202020204" pitchFamily="34" charset="0"/>
-              <a:buChar char="•"/>
-            </a:pPr>
-            <a:endParaRPr lang="vi-VN"/>
-          </a:p>
-          <a:p>
-            <a:pPr marL="342900" indent="-342900">
-              <a:buFont typeface="Arial" panose="020B0604020202020204" pitchFamily="34" charset="0"/>
-              <a:buChar char="•"/>
-            </a:pPr>
-            <a:endParaRPr lang="en-US" dirty="0"/>
+              <a:t>Easy see “FAIL” result with a different background color.</a:t>
+            </a:r>
           </a:p>
         </p:txBody>
       </p:sp>
     </p:spTree>
     <p:extLst>
       <p:ext uri="{BB962C8B-B14F-4D97-AF65-F5344CB8AC3E}">
-        <p14:creationId xmlns:p14="http://schemas.microsoft.com/office/powerpoint/2010/main" val="1850811800"/>
+        <p14:creationId xmlns:p14="http://schemas.microsoft.com/office/powerpoint/2010/main" val="4084338612"/>
+      </p:ext>
+    </p:extLst>
+  </p:cSld>
+  <p:clrMapOvr>
+    <a:masterClrMapping/>
+  </p:clrMapOvr>
+</p:sld>
+</file>
+
+<file path=ppt/slides/slide9.xml><?xml version="1.0" encoding="utf-8"?>
+<p:sld xmlns:a="http://schemas.openxmlformats.org/drawingml/2006/main" xmlns:r="http://schemas.openxmlformats.org/officeDocument/2006/relationships" xmlns:p="http://schemas.openxmlformats.org/presentationml/2006/main">
+  <p:cSld>
+    <p:spTree>
+      <p:nvGrpSpPr>
+        <p:cNvPr id="1" name=""/>
+        <p:cNvGrpSpPr/>
+        <p:nvPr/>
+      </p:nvGrpSpPr>
+      <p:grpSpPr>
+        <a:xfrm>
+          <a:off x="0" y="0"/>
+          <a:ext cx="0" cy="0"/>
+          <a:chOff x="0" y="0"/>
+          <a:chExt cx="0" cy="0"/>
+        </a:xfrm>
+      </p:grpSpPr>
+      <p:sp>
+        <p:nvSpPr>
+          <p:cNvPr id="2" name="Slide Number Placeholder 1"/>
+          <p:cNvSpPr>
+            <a:spLocks noGrp="1"/>
+          </p:cNvSpPr>
+          <p:nvPr>
+            <p:ph type="sldNum" sz="quarter" idx="4"/>
+          </p:nvPr>
+        </p:nvSpPr>
+        <p:spPr/>
+        <p:txBody>
+          <a:bodyPr/>
+          <a:lstStyle/>
+          <a:p>
+            <a:r>
+              <a:rPr lang="en-US" altLang="ko-KR"/>
+              <a:t>- </a:t>
+            </a:r>
+            <a:fld id="{7E2C4B30-5DF7-4A82-974D-B66255C87543}" type="slidenum">
+              <a:rPr lang="ko-KR" altLang="en-US" smtClean="0"/>
+              <a:pPr/>
+              <a:t>8</a:t>
+            </a:fld>
+            <a:r>
+              <a:rPr lang="ko-KR" altLang="en-US"/>
+              <a:t> </a:t>
+            </a:r>
+            <a:r>
+              <a:rPr lang="en-US" altLang="ko-KR"/>
+              <a:t>-</a:t>
+            </a:r>
+            <a:endParaRPr lang="ko-KR" altLang="en-US"/>
+          </a:p>
+        </p:txBody>
+      </p:sp>
+      <p:sp>
+        <p:nvSpPr>
+          <p:cNvPr id="4" name="TextBox 3"/>
+          <p:cNvSpPr txBox="1"/>
+          <p:nvPr/>
+        </p:nvSpPr>
+        <p:spPr>
+          <a:xfrm>
+            <a:off x="288634" y="164068"/>
+            <a:ext cx="3537700" cy="400110"/>
+          </a:xfrm>
+          <a:prstGeom prst="rect">
+            <a:avLst/>
+          </a:prstGeom>
+          <a:noFill/>
+        </p:spPr>
+        <p:txBody>
+          <a:bodyPr wrap="none" rtlCol="0">
+            <a:spAutoFit/>
+          </a:bodyPr>
+          <a:lstStyle/>
+          <a:p>
+            <a:r>
+              <a:rPr lang="vi-VN" sz="2000" b="1" dirty="0">
+                <a:latin typeface="+mj-lt"/>
+              </a:rPr>
+              <a:t>2. </a:t>
+            </a:r>
+            <a:r>
+              <a:rPr lang="en-US" sz="2000" b="1" dirty="0">
+                <a:latin typeface="+mj-lt"/>
+              </a:rPr>
+              <a:t>Arduino Controller Board</a:t>
+            </a:r>
+          </a:p>
+        </p:txBody>
+      </p:sp>
+      <p:pic>
+        <p:nvPicPr>
+          <p:cNvPr id="6" name="Picture 5">
+            <a:extLst>
+              <a:ext uri="{FF2B5EF4-FFF2-40B4-BE49-F238E27FC236}">
+                <a16:creationId xmlns:a16="http://schemas.microsoft.com/office/drawing/2014/main" id="{179466AF-6FAD-4974-ACE3-81DCEA71B9FC}"/>
+              </a:ext>
+            </a:extLst>
+          </p:cNvPr>
+          <p:cNvPicPr>
+            <a:picLocks noChangeAspect="1"/>
+          </p:cNvPicPr>
+          <p:nvPr/>
+        </p:nvPicPr>
+        <p:blipFill>
+          <a:blip r:embed="rId2"/>
+          <a:stretch>
+            <a:fillRect/>
+          </a:stretch>
+        </p:blipFill>
+        <p:spPr>
+          <a:xfrm>
+            <a:off x="4953000" y="838200"/>
+            <a:ext cx="4572000" cy="3148177"/>
+          </a:xfrm>
+          <a:prstGeom prst="rect">
+            <a:avLst/>
+          </a:prstGeom>
+        </p:spPr>
+      </p:pic>
+      <p:pic>
+        <p:nvPicPr>
+          <p:cNvPr id="13" name="Picture 12">
+            <a:extLst>
+              <a:ext uri="{FF2B5EF4-FFF2-40B4-BE49-F238E27FC236}">
+                <a16:creationId xmlns:a16="http://schemas.microsoft.com/office/drawing/2014/main" id="{05F5FFA6-F048-4B0F-A3A1-F6F3661292FF}"/>
+              </a:ext>
+            </a:extLst>
+          </p:cNvPr>
+          <p:cNvPicPr>
+            <a:picLocks noChangeAspect="1"/>
+          </p:cNvPicPr>
+          <p:nvPr/>
+        </p:nvPicPr>
+        <p:blipFill>
+          <a:blip r:embed="rId3"/>
+          <a:stretch>
+            <a:fillRect/>
+          </a:stretch>
+        </p:blipFill>
+        <p:spPr>
+          <a:xfrm>
+            <a:off x="314034" y="2950910"/>
+            <a:ext cx="4638966" cy="3473702"/>
+          </a:xfrm>
+          <a:prstGeom prst="rect">
+            <a:avLst/>
+          </a:prstGeom>
+        </p:spPr>
+      </p:pic>
+      <p:sp>
+        <p:nvSpPr>
+          <p:cNvPr id="14" name="TextBox 13">
+            <a:extLst>
+              <a:ext uri="{FF2B5EF4-FFF2-40B4-BE49-F238E27FC236}">
+                <a16:creationId xmlns:a16="http://schemas.microsoft.com/office/drawing/2014/main" id="{2E9E9F0F-0945-44C2-A243-29EE984557A7}"/>
+              </a:ext>
+            </a:extLst>
+          </p:cNvPr>
+          <p:cNvSpPr txBox="1"/>
+          <p:nvPr/>
+        </p:nvSpPr>
+        <p:spPr>
+          <a:xfrm>
+            <a:off x="568034" y="1283179"/>
+            <a:ext cx="4130966" cy="923330"/>
+          </a:xfrm>
+          <a:prstGeom prst="rect">
+            <a:avLst/>
+          </a:prstGeom>
+          <a:noFill/>
+        </p:spPr>
+        <p:txBody>
+          <a:bodyPr wrap="square" rtlCol="0">
+            <a:spAutoFit/>
+          </a:bodyPr>
+          <a:lstStyle/>
+          <a:p>
+            <a:r>
+              <a:rPr lang="en-US" dirty="0"/>
+              <a:t>Connection and state synchronization between software and PLC on the</a:t>
+            </a:r>
+            <a:r>
+              <a:rPr lang="vi-VN" dirty="0"/>
+              <a:t>    </a:t>
+            </a:r>
+            <a:r>
+              <a:rPr lang="en-US" dirty="0"/>
+              <a:t> conveyor belt.</a:t>
+            </a:r>
+          </a:p>
+        </p:txBody>
+      </p:sp>
+      <p:sp>
+        <p:nvSpPr>
+          <p:cNvPr id="15" name="TextBox 14">
+            <a:extLst>
+              <a:ext uri="{FF2B5EF4-FFF2-40B4-BE49-F238E27FC236}">
+                <a16:creationId xmlns:a16="http://schemas.microsoft.com/office/drawing/2014/main" id="{E8E647F0-A45D-45A1-8CAF-E14EDC07A06E}"/>
+              </a:ext>
+            </a:extLst>
+          </p:cNvPr>
+          <p:cNvSpPr txBox="1"/>
+          <p:nvPr/>
+        </p:nvSpPr>
+        <p:spPr>
+          <a:xfrm>
+            <a:off x="5357812" y="4687761"/>
+            <a:ext cx="4234153" cy="646239"/>
+          </a:xfrm>
+          <a:prstGeom prst="rect">
+            <a:avLst/>
+          </a:prstGeom>
+          <a:noFill/>
+        </p:spPr>
+        <p:txBody>
+          <a:bodyPr wrap="square" rtlCol="0">
+            <a:spAutoFit/>
+          </a:bodyPr>
+          <a:lstStyle/>
+          <a:p>
+            <a:r>
+              <a:rPr lang="en-US" dirty="0"/>
+              <a:t>Carousel activity simulation sample for software testing</a:t>
+            </a:r>
+          </a:p>
+        </p:txBody>
+      </p:sp>
+    </p:spTree>
+    <p:extLst>
+      <p:ext uri="{BB962C8B-B14F-4D97-AF65-F5344CB8AC3E}">
+        <p14:creationId xmlns:p14="http://schemas.microsoft.com/office/powerpoint/2010/main" val="576226019"/>
       </p:ext>
     </p:extLst>
   </p:cSld>

</xml_diff>